<commit_message>
Alteração em sala na documentação
</commit_message>
<xml_diff>
--- a/AEDs I/TP/TP - 1/Documentação TP/TP - prático imagens.pptx
+++ b/AEDs I/TP/TP - 1/Documentação TP/TP - prático imagens.pptx
@@ -106,6 +106,11 @@
       </a:defRPr>
     </a:lvl9pPr>
   </p:defaultTextStyle>
+  <p:extLst>
+    <p:ext uri="{EFAFB233-063F-42B5-8137-9DF3F51BA10A}">
+      <p15:sldGuideLst xmlns:p15="http://schemas.microsoft.com/office/powerpoint/2012/main"/>
+    </p:ext>
+  </p:extLst>
 </p:presentation>
 </file>
 
@@ -131,7 +136,7 @@
           <p:cNvPr id="2" name="Título 1">
             <a:extLst>
               <a:ext uri="{FF2B5EF4-FFF2-40B4-BE49-F238E27FC236}">
-                <a16:creationId xmlns:a16="http://schemas.microsoft.com/office/drawing/2014/main" id="{3D4ADC47-335F-D535-CC70-383C1D9873B7}"/>
+                <a16:creationId xmlns:a16="http://schemas.microsoft.com/office/drawing/2014/main" xmlns="" id="{3D4ADC47-335F-D535-CC70-383C1D9873B7}"/>
               </a:ext>
             </a:extLst>
           </p:cNvPr>
@@ -168,7 +173,7 @@
           <p:cNvPr id="3" name="Subtítulo 2">
             <a:extLst>
               <a:ext uri="{FF2B5EF4-FFF2-40B4-BE49-F238E27FC236}">
-                <a16:creationId xmlns:a16="http://schemas.microsoft.com/office/drawing/2014/main" id="{A7928269-494A-A588-3E33-94DF3659D836}"/>
+                <a16:creationId xmlns:a16="http://schemas.microsoft.com/office/drawing/2014/main" xmlns="" id="{A7928269-494A-A588-3E33-94DF3659D836}"/>
               </a:ext>
             </a:extLst>
           </p:cNvPr>
@@ -238,7 +243,7 @@
           <p:cNvPr id="4" name="Espaço Reservado para Data 3">
             <a:extLst>
               <a:ext uri="{FF2B5EF4-FFF2-40B4-BE49-F238E27FC236}">
-                <a16:creationId xmlns:a16="http://schemas.microsoft.com/office/drawing/2014/main" id="{AF4514C6-7246-DB3F-0B48-62FCB099D602}"/>
+                <a16:creationId xmlns:a16="http://schemas.microsoft.com/office/drawing/2014/main" xmlns="" id="{AF4514C6-7246-DB3F-0B48-62FCB099D602}"/>
               </a:ext>
             </a:extLst>
           </p:cNvPr>
@@ -256,7 +261,7 @@
           <a:p>
             <a:fld id="{C0200CA5-09B3-4C1E-87FC-48A38A3D5850}" type="datetimeFigureOut">
               <a:rPr lang="pt-BR" smtClean="0"/>
-              <a:t>25/09/2022</a:t>
+              <a:t>28/09/2022</a:t>
             </a:fld>
             <a:endParaRPr lang="pt-BR"/>
           </a:p>
@@ -267,7 +272,7 @@
           <p:cNvPr id="5" name="Espaço Reservado para Rodapé 4">
             <a:extLst>
               <a:ext uri="{FF2B5EF4-FFF2-40B4-BE49-F238E27FC236}">
-                <a16:creationId xmlns:a16="http://schemas.microsoft.com/office/drawing/2014/main" id="{5EBD551A-444C-70EB-26C6-8223959B85D9}"/>
+                <a16:creationId xmlns:a16="http://schemas.microsoft.com/office/drawing/2014/main" xmlns="" id="{5EBD551A-444C-70EB-26C6-8223959B85D9}"/>
               </a:ext>
             </a:extLst>
           </p:cNvPr>
@@ -292,7 +297,7 @@
           <p:cNvPr id="6" name="Espaço Reservado para Número de Slide 5">
             <a:extLst>
               <a:ext uri="{FF2B5EF4-FFF2-40B4-BE49-F238E27FC236}">
-                <a16:creationId xmlns:a16="http://schemas.microsoft.com/office/drawing/2014/main" id="{816B62D3-C17C-F7FE-CE42-DEAECAE75A9E}"/>
+                <a16:creationId xmlns:a16="http://schemas.microsoft.com/office/drawing/2014/main" xmlns="" id="{816B62D3-C17C-F7FE-CE42-DEAECAE75A9E}"/>
               </a:ext>
             </a:extLst>
           </p:cNvPr>
@@ -351,7 +356,7 @@
           <p:cNvPr id="2" name="Título 1">
             <a:extLst>
               <a:ext uri="{FF2B5EF4-FFF2-40B4-BE49-F238E27FC236}">
-                <a16:creationId xmlns:a16="http://schemas.microsoft.com/office/drawing/2014/main" id="{0F0938B9-9479-083B-E408-9B8C1EA29A82}"/>
+                <a16:creationId xmlns:a16="http://schemas.microsoft.com/office/drawing/2014/main" xmlns="" id="{0F0938B9-9479-083B-E408-9B8C1EA29A82}"/>
               </a:ext>
             </a:extLst>
           </p:cNvPr>
@@ -379,7 +384,7 @@
           <p:cNvPr id="3" name="Espaço Reservado para Texto Vertical 2">
             <a:extLst>
               <a:ext uri="{FF2B5EF4-FFF2-40B4-BE49-F238E27FC236}">
-                <a16:creationId xmlns:a16="http://schemas.microsoft.com/office/drawing/2014/main" id="{7701E837-62A6-E44E-D4C8-E9C6F6A1C964}"/>
+                <a16:creationId xmlns:a16="http://schemas.microsoft.com/office/drawing/2014/main" xmlns="" id="{7701E837-62A6-E44E-D4C8-E9C6F6A1C964}"/>
               </a:ext>
             </a:extLst>
           </p:cNvPr>
@@ -436,7 +441,7 @@
           <p:cNvPr id="4" name="Espaço Reservado para Data 3">
             <a:extLst>
               <a:ext uri="{FF2B5EF4-FFF2-40B4-BE49-F238E27FC236}">
-                <a16:creationId xmlns:a16="http://schemas.microsoft.com/office/drawing/2014/main" id="{79979799-D3A2-1AFE-DBCE-D0063155C885}"/>
+                <a16:creationId xmlns:a16="http://schemas.microsoft.com/office/drawing/2014/main" xmlns="" id="{79979799-D3A2-1AFE-DBCE-D0063155C885}"/>
               </a:ext>
             </a:extLst>
           </p:cNvPr>
@@ -454,7 +459,7 @@
           <a:p>
             <a:fld id="{C0200CA5-09B3-4C1E-87FC-48A38A3D5850}" type="datetimeFigureOut">
               <a:rPr lang="pt-BR" smtClean="0"/>
-              <a:t>25/09/2022</a:t>
+              <a:t>28/09/2022</a:t>
             </a:fld>
             <a:endParaRPr lang="pt-BR"/>
           </a:p>
@@ -465,7 +470,7 @@
           <p:cNvPr id="5" name="Espaço Reservado para Rodapé 4">
             <a:extLst>
               <a:ext uri="{FF2B5EF4-FFF2-40B4-BE49-F238E27FC236}">
-                <a16:creationId xmlns:a16="http://schemas.microsoft.com/office/drawing/2014/main" id="{1B811C79-A0F0-B6FE-C205-0EDC832BB93F}"/>
+                <a16:creationId xmlns:a16="http://schemas.microsoft.com/office/drawing/2014/main" xmlns="" id="{1B811C79-A0F0-B6FE-C205-0EDC832BB93F}"/>
               </a:ext>
             </a:extLst>
           </p:cNvPr>
@@ -490,7 +495,7 @@
           <p:cNvPr id="6" name="Espaço Reservado para Número de Slide 5">
             <a:extLst>
               <a:ext uri="{FF2B5EF4-FFF2-40B4-BE49-F238E27FC236}">
-                <a16:creationId xmlns:a16="http://schemas.microsoft.com/office/drawing/2014/main" id="{E63B996D-DE3D-6392-8C70-6F926B70CE27}"/>
+                <a16:creationId xmlns:a16="http://schemas.microsoft.com/office/drawing/2014/main" xmlns="" id="{E63B996D-DE3D-6392-8C70-6F926B70CE27}"/>
               </a:ext>
             </a:extLst>
           </p:cNvPr>
@@ -549,7 +554,7 @@
           <p:cNvPr id="2" name="Título Vertical 1">
             <a:extLst>
               <a:ext uri="{FF2B5EF4-FFF2-40B4-BE49-F238E27FC236}">
-                <a16:creationId xmlns:a16="http://schemas.microsoft.com/office/drawing/2014/main" id="{DD0B887F-0F9E-A115-F222-3FB5392C45BE}"/>
+                <a16:creationId xmlns:a16="http://schemas.microsoft.com/office/drawing/2014/main" xmlns="" id="{DD0B887F-0F9E-A115-F222-3FB5392C45BE}"/>
               </a:ext>
             </a:extLst>
           </p:cNvPr>
@@ -582,7 +587,7 @@
           <p:cNvPr id="3" name="Espaço Reservado para Texto Vertical 2">
             <a:extLst>
               <a:ext uri="{FF2B5EF4-FFF2-40B4-BE49-F238E27FC236}">
-                <a16:creationId xmlns:a16="http://schemas.microsoft.com/office/drawing/2014/main" id="{EE000D1F-8E4F-6139-90AB-DBA6319BE43B}"/>
+                <a16:creationId xmlns:a16="http://schemas.microsoft.com/office/drawing/2014/main" xmlns="" id="{EE000D1F-8E4F-6139-90AB-DBA6319BE43B}"/>
               </a:ext>
             </a:extLst>
           </p:cNvPr>
@@ -644,7 +649,7 @@
           <p:cNvPr id="4" name="Espaço Reservado para Data 3">
             <a:extLst>
               <a:ext uri="{FF2B5EF4-FFF2-40B4-BE49-F238E27FC236}">
-                <a16:creationId xmlns:a16="http://schemas.microsoft.com/office/drawing/2014/main" id="{AE96D21C-CF2A-B4C4-AC28-ABAF4D1DF78C}"/>
+                <a16:creationId xmlns:a16="http://schemas.microsoft.com/office/drawing/2014/main" xmlns="" id="{AE96D21C-CF2A-B4C4-AC28-ABAF4D1DF78C}"/>
               </a:ext>
             </a:extLst>
           </p:cNvPr>
@@ -662,7 +667,7 @@
           <a:p>
             <a:fld id="{C0200CA5-09B3-4C1E-87FC-48A38A3D5850}" type="datetimeFigureOut">
               <a:rPr lang="pt-BR" smtClean="0"/>
-              <a:t>25/09/2022</a:t>
+              <a:t>28/09/2022</a:t>
             </a:fld>
             <a:endParaRPr lang="pt-BR"/>
           </a:p>
@@ -673,7 +678,7 @@
           <p:cNvPr id="5" name="Espaço Reservado para Rodapé 4">
             <a:extLst>
               <a:ext uri="{FF2B5EF4-FFF2-40B4-BE49-F238E27FC236}">
-                <a16:creationId xmlns:a16="http://schemas.microsoft.com/office/drawing/2014/main" id="{15B0987E-756F-A10D-17E6-322592972460}"/>
+                <a16:creationId xmlns:a16="http://schemas.microsoft.com/office/drawing/2014/main" xmlns="" id="{15B0987E-756F-A10D-17E6-322592972460}"/>
               </a:ext>
             </a:extLst>
           </p:cNvPr>
@@ -698,7 +703,7 @@
           <p:cNvPr id="6" name="Espaço Reservado para Número de Slide 5">
             <a:extLst>
               <a:ext uri="{FF2B5EF4-FFF2-40B4-BE49-F238E27FC236}">
-                <a16:creationId xmlns:a16="http://schemas.microsoft.com/office/drawing/2014/main" id="{2018D522-AF2F-F595-5831-F2CEEF8A9427}"/>
+                <a16:creationId xmlns:a16="http://schemas.microsoft.com/office/drawing/2014/main" xmlns="" id="{2018D522-AF2F-F595-5831-F2CEEF8A9427}"/>
               </a:ext>
             </a:extLst>
           </p:cNvPr>
@@ -757,7 +762,7 @@
           <p:cNvPr id="2" name="Título 1">
             <a:extLst>
               <a:ext uri="{FF2B5EF4-FFF2-40B4-BE49-F238E27FC236}">
-                <a16:creationId xmlns:a16="http://schemas.microsoft.com/office/drawing/2014/main" id="{8A756445-4645-5AEB-8AF4-E5AFA8DA679A}"/>
+                <a16:creationId xmlns:a16="http://schemas.microsoft.com/office/drawing/2014/main" xmlns="" id="{8A756445-4645-5AEB-8AF4-E5AFA8DA679A}"/>
               </a:ext>
             </a:extLst>
           </p:cNvPr>
@@ -785,7 +790,7 @@
           <p:cNvPr id="3" name="Espaço Reservado para Conteúdo 2">
             <a:extLst>
               <a:ext uri="{FF2B5EF4-FFF2-40B4-BE49-F238E27FC236}">
-                <a16:creationId xmlns:a16="http://schemas.microsoft.com/office/drawing/2014/main" id="{BB36FD2D-AE37-6601-BBAD-3A3422469695}"/>
+                <a16:creationId xmlns:a16="http://schemas.microsoft.com/office/drawing/2014/main" xmlns="" id="{BB36FD2D-AE37-6601-BBAD-3A3422469695}"/>
               </a:ext>
             </a:extLst>
           </p:cNvPr>
@@ -842,7 +847,7 @@
           <p:cNvPr id="4" name="Espaço Reservado para Data 3">
             <a:extLst>
               <a:ext uri="{FF2B5EF4-FFF2-40B4-BE49-F238E27FC236}">
-                <a16:creationId xmlns:a16="http://schemas.microsoft.com/office/drawing/2014/main" id="{F1D2EA3E-5049-F2FE-8AEF-FAB111494F13}"/>
+                <a16:creationId xmlns:a16="http://schemas.microsoft.com/office/drawing/2014/main" xmlns="" id="{F1D2EA3E-5049-F2FE-8AEF-FAB111494F13}"/>
               </a:ext>
             </a:extLst>
           </p:cNvPr>
@@ -860,7 +865,7 @@
           <a:p>
             <a:fld id="{C0200CA5-09B3-4C1E-87FC-48A38A3D5850}" type="datetimeFigureOut">
               <a:rPr lang="pt-BR" smtClean="0"/>
-              <a:t>25/09/2022</a:t>
+              <a:t>28/09/2022</a:t>
             </a:fld>
             <a:endParaRPr lang="pt-BR"/>
           </a:p>
@@ -871,7 +876,7 @@
           <p:cNvPr id="5" name="Espaço Reservado para Rodapé 4">
             <a:extLst>
               <a:ext uri="{FF2B5EF4-FFF2-40B4-BE49-F238E27FC236}">
-                <a16:creationId xmlns:a16="http://schemas.microsoft.com/office/drawing/2014/main" id="{1C7E4A34-626F-4C76-6D74-B9288234EE21}"/>
+                <a16:creationId xmlns:a16="http://schemas.microsoft.com/office/drawing/2014/main" xmlns="" id="{1C7E4A34-626F-4C76-6D74-B9288234EE21}"/>
               </a:ext>
             </a:extLst>
           </p:cNvPr>
@@ -896,7 +901,7 @@
           <p:cNvPr id="6" name="Espaço Reservado para Número de Slide 5">
             <a:extLst>
               <a:ext uri="{FF2B5EF4-FFF2-40B4-BE49-F238E27FC236}">
-                <a16:creationId xmlns:a16="http://schemas.microsoft.com/office/drawing/2014/main" id="{D7440A4C-A87B-7EB5-6DD0-6C68A8600785}"/>
+                <a16:creationId xmlns:a16="http://schemas.microsoft.com/office/drawing/2014/main" xmlns="" id="{D7440A4C-A87B-7EB5-6DD0-6C68A8600785}"/>
               </a:ext>
             </a:extLst>
           </p:cNvPr>
@@ -955,7 +960,7 @@
           <p:cNvPr id="2" name="Título 1">
             <a:extLst>
               <a:ext uri="{FF2B5EF4-FFF2-40B4-BE49-F238E27FC236}">
-                <a16:creationId xmlns:a16="http://schemas.microsoft.com/office/drawing/2014/main" id="{DF4616C5-BEB4-F5B4-F70B-AD8B55C9F95D}"/>
+                <a16:creationId xmlns:a16="http://schemas.microsoft.com/office/drawing/2014/main" xmlns="" id="{DF4616C5-BEB4-F5B4-F70B-AD8B55C9F95D}"/>
               </a:ext>
             </a:extLst>
           </p:cNvPr>
@@ -992,7 +997,7 @@
           <p:cNvPr id="3" name="Espaço Reservado para Texto 2">
             <a:extLst>
               <a:ext uri="{FF2B5EF4-FFF2-40B4-BE49-F238E27FC236}">
-                <a16:creationId xmlns:a16="http://schemas.microsoft.com/office/drawing/2014/main" id="{C2004E45-6294-D9A1-2CE8-6AB02D4A1808}"/>
+                <a16:creationId xmlns:a16="http://schemas.microsoft.com/office/drawing/2014/main" xmlns="" id="{C2004E45-6294-D9A1-2CE8-6AB02D4A1808}"/>
               </a:ext>
             </a:extLst>
           </p:cNvPr>
@@ -1117,7 +1122,7 @@
           <p:cNvPr id="4" name="Espaço Reservado para Data 3">
             <a:extLst>
               <a:ext uri="{FF2B5EF4-FFF2-40B4-BE49-F238E27FC236}">
-                <a16:creationId xmlns:a16="http://schemas.microsoft.com/office/drawing/2014/main" id="{31A06ECE-72B7-348B-E534-409ED03B7BFF}"/>
+                <a16:creationId xmlns:a16="http://schemas.microsoft.com/office/drawing/2014/main" xmlns="" id="{31A06ECE-72B7-348B-E534-409ED03B7BFF}"/>
               </a:ext>
             </a:extLst>
           </p:cNvPr>
@@ -1135,7 +1140,7 @@
           <a:p>
             <a:fld id="{C0200CA5-09B3-4C1E-87FC-48A38A3D5850}" type="datetimeFigureOut">
               <a:rPr lang="pt-BR" smtClean="0"/>
-              <a:t>25/09/2022</a:t>
+              <a:t>28/09/2022</a:t>
             </a:fld>
             <a:endParaRPr lang="pt-BR"/>
           </a:p>
@@ -1146,7 +1151,7 @@
           <p:cNvPr id="5" name="Espaço Reservado para Rodapé 4">
             <a:extLst>
               <a:ext uri="{FF2B5EF4-FFF2-40B4-BE49-F238E27FC236}">
-                <a16:creationId xmlns:a16="http://schemas.microsoft.com/office/drawing/2014/main" id="{5338FE4D-3746-9697-D8B9-1E340B7B929C}"/>
+                <a16:creationId xmlns:a16="http://schemas.microsoft.com/office/drawing/2014/main" xmlns="" id="{5338FE4D-3746-9697-D8B9-1E340B7B929C}"/>
               </a:ext>
             </a:extLst>
           </p:cNvPr>
@@ -1171,7 +1176,7 @@
           <p:cNvPr id="6" name="Espaço Reservado para Número de Slide 5">
             <a:extLst>
               <a:ext uri="{FF2B5EF4-FFF2-40B4-BE49-F238E27FC236}">
-                <a16:creationId xmlns:a16="http://schemas.microsoft.com/office/drawing/2014/main" id="{7DB48DB3-5F46-33AB-3E1D-1089600EBDE2}"/>
+                <a16:creationId xmlns:a16="http://schemas.microsoft.com/office/drawing/2014/main" xmlns="" id="{7DB48DB3-5F46-33AB-3E1D-1089600EBDE2}"/>
               </a:ext>
             </a:extLst>
           </p:cNvPr>
@@ -1230,7 +1235,7 @@
           <p:cNvPr id="2" name="Título 1">
             <a:extLst>
               <a:ext uri="{FF2B5EF4-FFF2-40B4-BE49-F238E27FC236}">
-                <a16:creationId xmlns:a16="http://schemas.microsoft.com/office/drawing/2014/main" id="{F04FFD1E-87EA-1A01-43FE-095848DB7BD1}"/>
+                <a16:creationId xmlns:a16="http://schemas.microsoft.com/office/drawing/2014/main" xmlns="" id="{F04FFD1E-87EA-1A01-43FE-095848DB7BD1}"/>
               </a:ext>
             </a:extLst>
           </p:cNvPr>
@@ -1258,7 +1263,7 @@
           <p:cNvPr id="3" name="Espaço Reservado para Conteúdo 2">
             <a:extLst>
               <a:ext uri="{FF2B5EF4-FFF2-40B4-BE49-F238E27FC236}">
-                <a16:creationId xmlns:a16="http://schemas.microsoft.com/office/drawing/2014/main" id="{2F969113-BAA1-B943-59AF-E9BA9D779D3E}"/>
+                <a16:creationId xmlns:a16="http://schemas.microsoft.com/office/drawing/2014/main" xmlns="" id="{2F969113-BAA1-B943-59AF-E9BA9D779D3E}"/>
               </a:ext>
             </a:extLst>
           </p:cNvPr>
@@ -1320,7 +1325,7 @@
           <p:cNvPr id="4" name="Espaço Reservado para Conteúdo 3">
             <a:extLst>
               <a:ext uri="{FF2B5EF4-FFF2-40B4-BE49-F238E27FC236}">
-                <a16:creationId xmlns:a16="http://schemas.microsoft.com/office/drawing/2014/main" id="{E90EB877-159F-4252-F289-94C4197493DE}"/>
+                <a16:creationId xmlns:a16="http://schemas.microsoft.com/office/drawing/2014/main" xmlns="" id="{E90EB877-159F-4252-F289-94C4197493DE}"/>
               </a:ext>
             </a:extLst>
           </p:cNvPr>
@@ -1382,7 +1387,7 @@
           <p:cNvPr id="5" name="Espaço Reservado para Data 4">
             <a:extLst>
               <a:ext uri="{FF2B5EF4-FFF2-40B4-BE49-F238E27FC236}">
-                <a16:creationId xmlns:a16="http://schemas.microsoft.com/office/drawing/2014/main" id="{44377DBF-D32F-8EF1-1D9B-C50142541F87}"/>
+                <a16:creationId xmlns:a16="http://schemas.microsoft.com/office/drawing/2014/main" xmlns="" id="{44377DBF-D32F-8EF1-1D9B-C50142541F87}"/>
               </a:ext>
             </a:extLst>
           </p:cNvPr>
@@ -1400,7 +1405,7 @@
           <a:p>
             <a:fld id="{C0200CA5-09B3-4C1E-87FC-48A38A3D5850}" type="datetimeFigureOut">
               <a:rPr lang="pt-BR" smtClean="0"/>
-              <a:t>25/09/2022</a:t>
+              <a:t>28/09/2022</a:t>
             </a:fld>
             <a:endParaRPr lang="pt-BR"/>
           </a:p>
@@ -1411,7 +1416,7 @@
           <p:cNvPr id="6" name="Espaço Reservado para Rodapé 5">
             <a:extLst>
               <a:ext uri="{FF2B5EF4-FFF2-40B4-BE49-F238E27FC236}">
-                <a16:creationId xmlns:a16="http://schemas.microsoft.com/office/drawing/2014/main" id="{265CB2CC-5D66-91EC-6F14-9D4040B94134}"/>
+                <a16:creationId xmlns:a16="http://schemas.microsoft.com/office/drawing/2014/main" xmlns="" id="{265CB2CC-5D66-91EC-6F14-9D4040B94134}"/>
               </a:ext>
             </a:extLst>
           </p:cNvPr>
@@ -1436,7 +1441,7 @@
           <p:cNvPr id="7" name="Espaço Reservado para Número de Slide 6">
             <a:extLst>
               <a:ext uri="{FF2B5EF4-FFF2-40B4-BE49-F238E27FC236}">
-                <a16:creationId xmlns:a16="http://schemas.microsoft.com/office/drawing/2014/main" id="{60AB7AFC-E8A5-05CB-3B58-D0516E736AE9}"/>
+                <a16:creationId xmlns:a16="http://schemas.microsoft.com/office/drawing/2014/main" xmlns="" id="{60AB7AFC-E8A5-05CB-3B58-D0516E736AE9}"/>
               </a:ext>
             </a:extLst>
           </p:cNvPr>
@@ -1495,7 +1500,7 @@
           <p:cNvPr id="2" name="Título 1">
             <a:extLst>
               <a:ext uri="{FF2B5EF4-FFF2-40B4-BE49-F238E27FC236}">
-                <a16:creationId xmlns:a16="http://schemas.microsoft.com/office/drawing/2014/main" id="{F8C7FDE0-B2B1-8D79-697F-8E19B8C204C8}"/>
+                <a16:creationId xmlns:a16="http://schemas.microsoft.com/office/drawing/2014/main" xmlns="" id="{F8C7FDE0-B2B1-8D79-697F-8E19B8C204C8}"/>
               </a:ext>
             </a:extLst>
           </p:cNvPr>
@@ -1528,7 +1533,7 @@
           <p:cNvPr id="3" name="Espaço Reservado para Texto 2">
             <a:extLst>
               <a:ext uri="{FF2B5EF4-FFF2-40B4-BE49-F238E27FC236}">
-                <a16:creationId xmlns:a16="http://schemas.microsoft.com/office/drawing/2014/main" id="{3F316915-3203-C1A1-465B-B392AD808A6D}"/>
+                <a16:creationId xmlns:a16="http://schemas.microsoft.com/office/drawing/2014/main" xmlns="" id="{3F316915-3203-C1A1-465B-B392AD808A6D}"/>
               </a:ext>
             </a:extLst>
           </p:cNvPr>
@@ -1599,7 +1604,7 @@
           <p:cNvPr id="4" name="Espaço Reservado para Conteúdo 3">
             <a:extLst>
               <a:ext uri="{FF2B5EF4-FFF2-40B4-BE49-F238E27FC236}">
-                <a16:creationId xmlns:a16="http://schemas.microsoft.com/office/drawing/2014/main" id="{E95A9758-7B51-F093-42D7-6A5476B16666}"/>
+                <a16:creationId xmlns:a16="http://schemas.microsoft.com/office/drawing/2014/main" xmlns="" id="{E95A9758-7B51-F093-42D7-6A5476B16666}"/>
               </a:ext>
             </a:extLst>
           </p:cNvPr>
@@ -1661,7 +1666,7 @@
           <p:cNvPr id="5" name="Espaço Reservado para Texto 4">
             <a:extLst>
               <a:ext uri="{FF2B5EF4-FFF2-40B4-BE49-F238E27FC236}">
-                <a16:creationId xmlns:a16="http://schemas.microsoft.com/office/drawing/2014/main" id="{05BAFE66-85D5-3CDF-0CA3-F8DF063F04A1}"/>
+                <a16:creationId xmlns:a16="http://schemas.microsoft.com/office/drawing/2014/main" xmlns="" id="{05BAFE66-85D5-3CDF-0CA3-F8DF063F04A1}"/>
               </a:ext>
             </a:extLst>
           </p:cNvPr>
@@ -1732,7 +1737,7 @@
           <p:cNvPr id="6" name="Espaço Reservado para Conteúdo 5">
             <a:extLst>
               <a:ext uri="{FF2B5EF4-FFF2-40B4-BE49-F238E27FC236}">
-                <a16:creationId xmlns:a16="http://schemas.microsoft.com/office/drawing/2014/main" id="{7606DA02-E8B8-175E-0364-7B5D42A6CE23}"/>
+                <a16:creationId xmlns:a16="http://schemas.microsoft.com/office/drawing/2014/main" xmlns="" id="{7606DA02-E8B8-175E-0364-7B5D42A6CE23}"/>
               </a:ext>
             </a:extLst>
           </p:cNvPr>
@@ -1794,7 +1799,7 @@
           <p:cNvPr id="7" name="Espaço Reservado para Data 6">
             <a:extLst>
               <a:ext uri="{FF2B5EF4-FFF2-40B4-BE49-F238E27FC236}">
-                <a16:creationId xmlns:a16="http://schemas.microsoft.com/office/drawing/2014/main" id="{81726C03-E8F6-36A4-810B-D3B470CB56EF}"/>
+                <a16:creationId xmlns:a16="http://schemas.microsoft.com/office/drawing/2014/main" xmlns="" id="{81726C03-E8F6-36A4-810B-D3B470CB56EF}"/>
               </a:ext>
             </a:extLst>
           </p:cNvPr>
@@ -1812,7 +1817,7 @@
           <a:p>
             <a:fld id="{C0200CA5-09B3-4C1E-87FC-48A38A3D5850}" type="datetimeFigureOut">
               <a:rPr lang="pt-BR" smtClean="0"/>
-              <a:t>25/09/2022</a:t>
+              <a:t>28/09/2022</a:t>
             </a:fld>
             <a:endParaRPr lang="pt-BR"/>
           </a:p>
@@ -1823,7 +1828,7 @@
           <p:cNvPr id="8" name="Espaço Reservado para Rodapé 7">
             <a:extLst>
               <a:ext uri="{FF2B5EF4-FFF2-40B4-BE49-F238E27FC236}">
-                <a16:creationId xmlns:a16="http://schemas.microsoft.com/office/drawing/2014/main" id="{7CA49CF8-6096-2F55-65B2-04AD59CCB546}"/>
+                <a16:creationId xmlns:a16="http://schemas.microsoft.com/office/drawing/2014/main" xmlns="" id="{7CA49CF8-6096-2F55-65B2-04AD59CCB546}"/>
               </a:ext>
             </a:extLst>
           </p:cNvPr>
@@ -1848,7 +1853,7 @@
           <p:cNvPr id="9" name="Espaço Reservado para Número de Slide 8">
             <a:extLst>
               <a:ext uri="{FF2B5EF4-FFF2-40B4-BE49-F238E27FC236}">
-                <a16:creationId xmlns:a16="http://schemas.microsoft.com/office/drawing/2014/main" id="{BB39AD80-4A80-0984-7B5D-3B5314309123}"/>
+                <a16:creationId xmlns:a16="http://schemas.microsoft.com/office/drawing/2014/main" xmlns="" id="{BB39AD80-4A80-0984-7B5D-3B5314309123}"/>
               </a:ext>
             </a:extLst>
           </p:cNvPr>
@@ -1907,7 +1912,7 @@
           <p:cNvPr id="2" name="Título 1">
             <a:extLst>
               <a:ext uri="{FF2B5EF4-FFF2-40B4-BE49-F238E27FC236}">
-                <a16:creationId xmlns:a16="http://schemas.microsoft.com/office/drawing/2014/main" id="{F5C59FE0-0B86-D8AF-EE12-22AA581F052F}"/>
+                <a16:creationId xmlns:a16="http://schemas.microsoft.com/office/drawing/2014/main" xmlns="" id="{F5C59FE0-0B86-D8AF-EE12-22AA581F052F}"/>
               </a:ext>
             </a:extLst>
           </p:cNvPr>
@@ -1935,7 +1940,7 @@
           <p:cNvPr id="3" name="Espaço Reservado para Data 2">
             <a:extLst>
               <a:ext uri="{FF2B5EF4-FFF2-40B4-BE49-F238E27FC236}">
-                <a16:creationId xmlns:a16="http://schemas.microsoft.com/office/drawing/2014/main" id="{CD3EFD5C-BE3C-AF19-80A1-ED21F98398CD}"/>
+                <a16:creationId xmlns:a16="http://schemas.microsoft.com/office/drawing/2014/main" xmlns="" id="{CD3EFD5C-BE3C-AF19-80A1-ED21F98398CD}"/>
               </a:ext>
             </a:extLst>
           </p:cNvPr>
@@ -1953,7 +1958,7 @@
           <a:p>
             <a:fld id="{C0200CA5-09B3-4C1E-87FC-48A38A3D5850}" type="datetimeFigureOut">
               <a:rPr lang="pt-BR" smtClean="0"/>
-              <a:t>25/09/2022</a:t>
+              <a:t>28/09/2022</a:t>
             </a:fld>
             <a:endParaRPr lang="pt-BR"/>
           </a:p>
@@ -1964,7 +1969,7 @@
           <p:cNvPr id="4" name="Espaço Reservado para Rodapé 3">
             <a:extLst>
               <a:ext uri="{FF2B5EF4-FFF2-40B4-BE49-F238E27FC236}">
-                <a16:creationId xmlns:a16="http://schemas.microsoft.com/office/drawing/2014/main" id="{3F276053-B3A3-1DC9-81D2-F42F96B6AFC8}"/>
+                <a16:creationId xmlns:a16="http://schemas.microsoft.com/office/drawing/2014/main" xmlns="" id="{3F276053-B3A3-1DC9-81D2-F42F96B6AFC8}"/>
               </a:ext>
             </a:extLst>
           </p:cNvPr>
@@ -1989,7 +1994,7 @@
           <p:cNvPr id="5" name="Espaço Reservado para Número de Slide 4">
             <a:extLst>
               <a:ext uri="{FF2B5EF4-FFF2-40B4-BE49-F238E27FC236}">
-                <a16:creationId xmlns:a16="http://schemas.microsoft.com/office/drawing/2014/main" id="{24A45EDC-B742-E1FE-E070-85692A283526}"/>
+                <a16:creationId xmlns:a16="http://schemas.microsoft.com/office/drawing/2014/main" xmlns="" id="{24A45EDC-B742-E1FE-E070-85692A283526}"/>
               </a:ext>
             </a:extLst>
           </p:cNvPr>
@@ -2048,7 +2053,7 @@
           <p:cNvPr id="2" name="Espaço Reservado para Data 1">
             <a:extLst>
               <a:ext uri="{FF2B5EF4-FFF2-40B4-BE49-F238E27FC236}">
-                <a16:creationId xmlns:a16="http://schemas.microsoft.com/office/drawing/2014/main" id="{6CB90B9F-F79C-67A2-0A6E-F5B3FA831B5C}"/>
+                <a16:creationId xmlns:a16="http://schemas.microsoft.com/office/drawing/2014/main" xmlns="" id="{6CB90B9F-F79C-67A2-0A6E-F5B3FA831B5C}"/>
               </a:ext>
             </a:extLst>
           </p:cNvPr>
@@ -2066,7 +2071,7 @@
           <a:p>
             <a:fld id="{C0200CA5-09B3-4C1E-87FC-48A38A3D5850}" type="datetimeFigureOut">
               <a:rPr lang="pt-BR" smtClean="0"/>
-              <a:t>25/09/2022</a:t>
+              <a:t>28/09/2022</a:t>
             </a:fld>
             <a:endParaRPr lang="pt-BR"/>
           </a:p>
@@ -2077,7 +2082,7 @@
           <p:cNvPr id="3" name="Espaço Reservado para Rodapé 2">
             <a:extLst>
               <a:ext uri="{FF2B5EF4-FFF2-40B4-BE49-F238E27FC236}">
-                <a16:creationId xmlns:a16="http://schemas.microsoft.com/office/drawing/2014/main" id="{B8E34255-5314-7E51-0638-5BFB6FCF28C2}"/>
+                <a16:creationId xmlns:a16="http://schemas.microsoft.com/office/drawing/2014/main" xmlns="" id="{B8E34255-5314-7E51-0638-5BFB6FCF28C2}"/>
               </a:ext>
             </a:extLst>
           </p:cNvPr>
@@ -2102,7 +2107,7 @@
           <p:cNvPr id="4" name="Espaço Reservado para Número de Slide 3">
             <a:extLst>
               <a:ext uri="{FF2B5EF4-FFF2-40B4-BE49-F238E27FC236}">
-                <a16:creationId xmlns:a16="http://schemas.microsoft.com/office/drawing/2014/main" id="{98B69926-290B-0C69-DDF4-4F71A6ABF666}"/>
+                <a16:creationId xmlns:a16="http://schemas.microsoft.com/office/drawing/2014/main" xmlns="" id="{98B69926-290B-0C69-DDF4-4F71A6ABF666}"/>
               </a:ext>
             </a:extLst>
           </p:cNvPr>
@@ -2161,7 +2166,7 @@
           <p:cNvPr id="2" name="Título 1">
             <a:extLst>
               <a:ext uri="{FF2B5EF4-FFF2-40B4-BE49-F238E27FC236}">
-                <a16:creationId xmlns:a16="http://schemas.microsoft.com/office/drawing/2014/main" id="{8541AF4E-68F6-40AA-2AC1-92D224B96690}"/>
+                <a16:creationId xmlns:a16="http://schemas.microsoft.com/office/drawing/2014/main" xmlns="" id="{8541AF4E-68F6-40AA-2AC1-92D224B96690}"/>
               </a:ext>
             </a:extLst>
           </p:cNvPr>
@@ -2198,7 +2203,7 @@
           <p:cNvPr id="3" name="Espaço Reservado para Conteúdo 2">
             <a:extLst>
               <a:ext uri="{FF2B5EF4-FFF2-40B4-BE49-F238E27FC236}">
-                <a16:creationId xmlns:a16="http://schemas.microsoft.com/office/drawing/2014/main" id="{F972DAA8-F157-81D0-3F90-25434F6F60B2}"/>
+                <a16:creationId xmlns:a16="http://schemas.microsoft.com/office/drawing/2014/main" xmlns="" id="{F972DAA8-F157-81D0-3F90-25434F6F60B2}"/>
               </a:ext>
             </a:extLst>
           </p:cNvPr>
@@ -2288,7 +2293,7 @@
           <p:cNvPr id="4" name="Espaço Reservado para Texto 3">
             <a:extLst>
               <a:ext uri="{FF2B5EF4-FFF2-40B4-BE49-F238E27FC236}">
-                <a16:creationId xmlns:a16="http://schemas.microsoft.com/office/drawing/2014/main" id="{A1D524CB-D9D8-6D61-DB15-62E5E3FBA0B6}"/>
+                <a16:creationId xmlns:a16="http://schemas.microsoft.com/office/drawing/2014/main" xmlns="" id="{A1D524CB-D9D8-6D61-DB15-62E5E3FBA0B6}"/>
               </a:ext>
             </a:extLst>
           </p:cNvPr>
@@ -2359,7 +2364,7 @@
           <p:cNvPr id="5" name="Espaço Reservado para Data 4">
             <a:extLst>
               <a:ext uri="{FF2B5EF4-FFF2-40B4-BE49-F238E27FC236}">
-                <a16:creationId xmlns:a16="http://schemas.microsoft.com/office/drawing/2014/main" id="{45ABE571-8C10-4E2E-8FB0-53C9B72AD443}"/>
+                <a16:creationId xmlns:a16="http://schemas.microsoft.com/office/drawing/2014/main" xmlns="" id="{45ABE571-8C10-4E2E-8FB0-53C9B72AD443}"/>
               </a:ext>
             </a:extLst>
           </p:cNvPr>
@@ -2377,7 +2382,7 @@
           <a:p>
             <a:fld id="{C0200CA5-09B3-4C1E-87FC-48A38A3D5850}" type="datetimeFigureOut">
               <a:rPr lang="pt-BR" smtClean="0"/>
-              <a:t>25/09/2022</a:t>
+              <a:t>28/09/2022</a:t>
             </a:fld>
             <a:endParaRPr lang="pt-BR"/>
           </a:p>
@@ -2388,7 +2393,7 @@
           <p:cNvPr id="6" name="Espaço Reservado para Rodapé 5">
             <a:extLst>
               <a:ext uri="{FF2B5EF4-FFF2-40B4-BE49-F238E27FC236}">
-                <a16:creationId xmlns:a16="http://schemas.microsoft.com/office/drawing/2014/main" id="{E8195BC0-435A-1166-DC97-51FC81930D51}"/>
+                <a16:creationId xmlns:a16="http://schemas.microsoft.com/office/drawing/2014/main" xmlns="" id="{E8195BC0-435A-1166-DC97-51FC81930D51}"/>
               </a:ext>
             </a:extLst>
           </p:cNvPr>
@@ -2413,7 +2418,7 @@
           <p:cNvPr id="7" name="Espaço Reservado para Número de Slide 6">
             <a:extLst>
               <a:ext uri="{FF2B5EF4-FFF2-40B4-BE49-F238E27FC236}">
-                <a16:creationId xmlns:a16="http://schemas.microsoft.com/office/drawing/2014/main" id="{D09252DA-C7F6-FF71-CE3F-765F500D3D8B}"/>
+                <a16:creationId xmlns:a16="http://schemas.microsoft.com/office/drawing/2014/main" xmlns="" id="{D09252DA-C7F6-FF71-CE3F-765F500D3D8B}"/>
               </a:ext>
             </a:extLst>
           </p:cNvPr>
@@ -2472,7 +2477,7 @@
           <p:cNvPr id="2" name="Título 1">
             <a:extLst>
               <a:ext uri="{FF2B5EF4-FFF2-40B4-BE49-F238E27FC236}">
-                <a16:creationId xmlns:a16="http://schemas.microsoft.com/office/drawing/2014/main" id="{C888C4D2-F7EE-0363-C0CB-16D614DEA511}"/>
+                <a16:creationId xmlns:a16="http://schemas.microsoft.com/office/drawing/2014/main" xmlns="" id="{C888C4D2-F7EE-0363-C0CB-16D614DEA511}"/>
               </a:ext>
             </a:extLst>
           </p:cNvPr>
@@ -2509,7 +2514,7 @@
           <p:cNvPr id="3" name="Espaço Reservado para Imagem 2">
             <a:extLst>
               <a:ext uri="{FF2B5EF4-FFF2-40B4-BE49-F238E27FC236}">
-                <a16:creationId xmlns:a16="http://schemas.microsoft.com/office/drawing/2014/main" id="{36219A2D-CE67-F03B-656E-3A13223BFE0B}"/>
+                <a16:creationId xmlns:a16="http://schemas.microsoft.com/office/drawing/2014/main" xmlns="" id="{36219A2D-CE67-F03B-656E-3A13223BFE0B}"/>
               </a:ext>
             </a:extLst>
           </p:cNvPr>
@@ -2576,7 +2581,7 @@
           <p:cNvPr id="4" name="Espaço Reservado para Texto 3">
             <a:extLst>
               <a:ext uri="{FF2B5EF4-FFF2-40B4-BE49-F238E27FC236}">
-                <a16:creationId xmlns:a16="http://schemas.microsoft.com/office/drawing/2014/main" id="{FE5EACC9-657F-BDBD-A6E3-88C5DB574153}"/>
+                <a16:creationId xmlns:a16="http://schemas.microsoft.com/office/drawing/2014/main" xmlns="" id="{FE5EACC9-657F-BDBD-A6E3-88C5DB574153}"/>
               </a:ext>
             </a:extLst>
           </p:cNvPr>
@@ -2647,7 +2652,7 @@
           <p:cNvPr id="5" name="Espaço Reservado para Data 4">
             <a:extLst>
               <a:ext uri="{FF2B5EF4-FFF2-40B4-BE49-F238E27FC236}">
-                <a16:creationId xmlns:a16="http://schemas.microsoft.com/office/drawing/2014/main" id="{9139D371-5DA0-7118-7228-E2A41712BE72}"/>
+                <a16:creationId xmlns:a16="http://schemas.microsoft.com/office/drawing/2014/main" xmlns="" id="{9139D371-5DA0-7118-7228-E2A41712BE72}"/>
               </a:ext>
             </a:extLst>
           </p:cNvPr>
@@ -2665,7 +2670,7 @@
           <a:p>
             <a:fld id="{C0200CA5-09B3-4C1E-87FC-48A38A3D5850}" type="datetimeFigureOut">
               <a:rPr lang="pt-BR" smtClean="0"/>
-              <a:t>25/09/2022</a:t>
+              <a:t>28/09/2022</a:t>
             </a:fld>
             <a:endParaRPr lang="pt-BR"/>
           </a:p>
@@ -2676,7 +2681,7 @@
           <p:cNvPr id="6" name="Espaço Reservado para Rodapé 5">
             <a:extLst>
               <a:ext uri="{FF2B5EF4-FFF2-40B4-BE49-F238E27FC236}">
-                <a16:creationId xmlns:a16="http://schemas.microsoft.com/office/drawing/2014/main" id="{EFE0DC61-52A6-2837-C188-A418E7EC124D}"/>
+                <a16:creationId xmlns:a16="http://schemas.microsoft.com/office/drawing/2014/main" xmlns="" id="{EFE0DC61-52A6-2837-C188-A418E7EC124D}"/>
               </a:ext>
             </a:extLst>
           </p:cNvPr>
@@ -2701,7 +2706,7 @@
           <p:cNvPr id="7" name="Espaço Reservado para Número de Slide 6">
             <a:extLst>
               <a:ext uri="{FF2B5EF4-FFF2-40B4-BE49-F238E27FC236}">
-                <a16:creationId xmlns:a16="http://schemas.microsoft.com/office/drawing/2014/main" id="{580F9A34-9A6B-A869-0B47-1EFB46BDA610}"/>
+                <a16:creationId xmlns:a16="http://schemas.microsoft.com/office/drawing/2014/main" xmlns="" id="{580F9A34-9A6B-A869-0B47-1EFB46BDA610}"/>
               </a:ext>
             </a:extLst>
           </p:cNvPr>
@@ -2765,7 +2770,7 @@
           <p:cNvPr id="2" name="Espaço Reservado para Título 1">
             <a:extLst>
               <a:ext uri="{FF2B5EF4-FFF2-40B4-BE49-F238E27FC236}">
-                <a16:creationId xmlns:a16="http://schemas.microsoft.com/office/drawing/2014/main" id="{32AA9A6D-ACAF-C29D-5184-90936D0C17B8}"/>
+                <a16:creationId xmlns:a16="http://schemas.microsoft.com/office/drawing/2014/main" xmlns="" id="{32AA9A6D-ACAF-C29D-5184-90936D0C17B8}"/>
               </a:ext>
             </a:extLst>
           </p:cNvPr>
@@ -2803,7 +2808,7 @@
           <p:cNvPr id="3" name="Espaço Reservado para Texto 2">
             <a:extLst>
               <a:ext uri="{FF2B5EF4-FFF2-40B4-BE49-F238E27FC236}">
-                <a16:creationId xmlns:a16="http://schemas.microsoft.com/office/drawing/2014/main" id="{6A59F481-1254-E247-CA0F-9149E42F7338}"/>
+                <a16:creationId xmlns:a16="http://schemas.microsoft.com/office/drawing/2014/main" xmlns="" id="{6A59F481-1254-E247-CA0F-9149E42F7338}"/>
               </a:ext>
             </a:extLst>
           </p:cNvPr>
@@ -2870,7 +2875,7 @@
           <p:cNvPr id="4" name="Espaço Reservado para Data 3">
             <a:extLst>
               <a:ext uri="{FF2B5EF4-FFF2-40B4-BE49-F238E27FC236}">
-                <a16:creationId xmlns:a16="http://schemas.microsoft.com/office/drawing/2014/main" id="{7F8A780C-C37E-156B-283D-CD03831C75BB}"/>
+                <a16:creationId xmlns:a16="http://schemas.microsoft.com/office/drawing/2014/main" xmlns="" id="{7F8A780C-C37E-156B-283D-CD03831C75BB}"/>
               </a:ext>
             </a:extLst>
           </p:cNvPr>
@@ -2906,7 +2911,7 @@
           <a:p>
             <a:fld id="{C0200CA5-09B3-4C1E-87FC-48A38A3D5850}" type="datetimeFigureOut">
               <a:rPr lang="pt-BR" smtClean="0"/>
-              <a:t>25/09/2022</a:t>
+              <a:t>28/09/2022</a:t>
             </a:fld>
             <a:endParaRPr lang="pt-BR"/>
           </a:p>
@@ -2917,7 +2922,7 @@
           <p:cNvPr id="5" name="Espaço Reservado para Rodapé 4">
             <a:extLst>
               <a:ext uri="{FF2B5EF4-FFF2-40B4-BE49-F238E27FC236}">
-                <a16:creationId xmlns:a16="http://schemas.microsoft.com/office/drawing/2014/main" id="{DF1DC42A-E505-8493-7834-25DA37AC255A}"/>
+                <a16:creationId xmlns:a16="http://schemas.microsoft.com/office/drawing/2014/main" xmlns="" id="{DF1DC42A-E505-8493-7834-25DA37AC255A}"/>
               </a:ext>
             </a:extLst>
           </p:cNvPr>
@@ -2960,7 +2965,7 @@
           <p:cNvPr id="6" name="Espaço Reservado para Número de Slide 5">
             <a:extLst>
               <a:ext uri="{FF2B5EF4-FFF2-40B4-BE49-F238E27FC236}">
-                <a16:creationId xmlns:a16="http://schemas.microsoft.com/office/drawing/2014/main" id="{C60BB2B7-5EAC-2B8E-B272-D22224FE1D6E}"/>
+                <a16:creationId xmlns:a16="http://schemas.microsoft.com/office/drawing/2014/main" xmlns="" id="{C60BB2B7-5EAC-2B8E-B272-D22224FE1D6E}"/>
               </a:ext>
             </a:extLst>
           </p:cNvPr>
@@ -3328,7 +3333,7 @@
           <p:cNvPr id="4" name="Retângulo 3">
             <a:extLst>
               <a:ext uri="{FF2B5EF4-FFF2-40B4-BE49-F238E27FC236}">
-                <a16:creationId xmlns:a16="http://schemas.microsoft.com/office/drawing/2014/main" id="{90D65C8D-FCD0-5354-4E8F-31D4E3416352}"/>
+                <a16:creationId xmlns:a16="http://schemas.microsoft.com/office/drawing/2014/main" xmlns="" id="{90D65C8D-FCD0-5354-4E8F-31D4E3416352}"/>
               </a:ext>
             </a:extLst>
           </p:cNvPr>
@@ -3375,7 +3380,7 @@
           <p:cNvPr id="5" name="Retângulo 4">
             <a:extLst>
               <a:ext uri="{FF2B5EF4-FFF2-40B4-BE49-F238E27FC236}">
-                <a16:creationId xmlns:a16="http://schemas.microsoft.com/office/drawing/2014/main" id="{E87EB149-3F24-3F2D-5AC4-F2A93427CB9B}"/>
+                <a16:creationId xmlns:a16="http://schemas.microsoft.com/office/drawing/2014/main" xmlns="" id="{E87EB149-3F24-3F2D-5AC4-F2A93427CB9B}"/>
               </a:ext>
             </a:extLst>
           </p:cNvPr>
@@ -3422,7 +3427,7 @@
           <p:cNvPr id="6" name="Retângulo 5">
             <a:extLst>
               <a:ext uri="{FF2B5EF4-FFF2-40B4-BE49-F238E27FC236}">
-                <a16:creationId xmlns:a16="http://schemas.microsoft.com/office/drawing/2014/main" id="{3E7CE1CE-9C0A-DD5F-B61A-8D6D0BCE815B}"/>
+                <a16:creationId xmlns:a16="http://schemas.microsoft.com/office/drawing/2014/main" xmlns="" id="{3E7CE1CE-9C0A-DD5F-B61A-8D6D0BCE815B}"/>
               </a:ext>
             </a:extLst>
           </p:cNvPr>
@@ -3469,7 +3474,7 @@
           <p:cNvPr id="7" name="Retângulo 6">
             <a:extLst>
               <a:ext uri="{FF2B5EF4-FFF2-40B4-BE49-F238E27FC236}">
-                <a16:creationId xmlns:a16="http://schemas.microsoft.com/office/drawing/2014/main" id="{F9FDFD4E-4939-3DB5-B633-4B40B7944976}"/>
+                <a16:creationId xmlns:a16="http://schemas.microsoft.com/office/drawing/2014/main" xmlns="" id="{F9FDFD4E-4939-3DB5-B633-4B40B7944976}"/>
               </a:ext>
             </a:extLst>
           </p:cNvPr>
@@ -3516,7 +3521,7 @@
           <p:cNvPr id="8" name="Retângulo 7">
             <a:extLst>
               <a:ext uri="{FF2B5EF4-FFF2-40B4-BE49-F238E27FC236}">
-                <a16:creationId xmlns:a16="http://schemas.microsoft.com/office/drawing/2014/main" id="{54BC3C86-53E3-D885-DEEC-5FA6AB8E2A52}"/>
+                <a16:creationId xmlns:a16="http://schemas.microsoft.com/office/drawing/2014/main" xmlns="" id="{54BC3C86-53E3-D885-DEEC-5FA6AB8E2A52}"/>
               </a:ext>
             </a:extLst>
           </p:cNvPr>
@@ -3563,7 +3568,7 @@
           <p:cNvPr id="9" name="CaixaDeTexto 8">
             <a:extLst>
               <a:ext uri="{FF2B5EF4-FFF2-40B4-BE49-F238E27FC236}">
-                <a16:creationId xmlns:a16="http://schemas.microsoft.com/office/drawing/2014/main" id="{7C2A7578-3143-AAC7-E531-D97F759C7100}"/>
+                <a16:creationId xmlns:a16="http://schemas.microsoft.com/office/drawing/2014/main" xmlns="" id="{7C2A7578-3143-AAC7-E531-D97F759C7100}"/>
               </a:ext>
             </a:extLst>
           </p:cNvPr>
@@ -3572,8 +3577,8 @@
         </p:nvSpPr>
         <p:spPr>
           <a:xfrm>
-            <a:off x="3063922" y="1753316"/>
-            <a:ext cx="436729" cy="369332"/>
+            <a:off x="2920621" y="1753316"/>
+            <a:ext cx="702860" cy="369332"/>
           </a:xfrm>
           <a:prstGeom prst="rect">
             <a:avLst/>
@@ -3588,11 +3593,11 @@
           <a:p>
             <a:pPr algn="ctr"/>
             <a:r>
-              <a:rPr lang="pt-BR" dirty="0"/>
-              <a:t>x</a:t>
-            </a:r>
-            <a:r>
-              <a:rPr lang="pt-BR" baseline="-25000" dirty="0"/>
+              <a:rPr lang="pt-BR" dirty="0" smtClean="0"/>
+              <a:t>item</a:t>
+            </a:r>
+            <a:r>
+              <a:rPr lang="pt-BR" baseline="-25000" dirty="0" smtClean="0"/>
               <a:t>1</a:t>
             </a:r>
             <a:endParaRPr lang="pt-BR" dirty="0"/>
@@ -3604,7 +3609,7 @@
           <p:cNvPr id="10" name="CaixaDeTexto 9">
             <a:extLst>
               <a:ext uri="{FF2B5EF4-FFF2-40B4-BE49-F238E27FC236}">
-                <a16:creationId xmlns:a16="http://schemas.microsoft.com/office/drawing/2014/main" id="{27F4092A-BE72-8893-CB2F-9E91D52092EC}"/>
+                <a16:creationId xmlns:a16="http://schemas.microsoft.com/office/drawing/2014/main" xmlns="" id="{27F4092A-BE72-8893-CB2F-9E91D52092EC}"/>
               </a:ext>
             </a:extLst>
           </p:cNvPr>
@@ -3613,8 +3618,8 @@
         </p:nvSpPr>
         <p:spPr>
           <a:xfrm>
-            <a:off x="4032912" y="1753316"/>
-            <a:ext cx="436729" cy="369332"/>
+            <a:off x="3910083" y="1753316"/>
+            <a:ext cx="709684" cy="369332"/>
           </a:xfrm>
           <a:prstGeom prst="rect">
             <a:avLst/>
@@ -3629,11 +3634,11 @@
           <a:p>
             <a:pPr algn="ctr"/>
             <a:r>
-              <a:rPr lang="pt-BR" dirty="0"/>
-              <a:t>x</a:t>
-            </a:r>
-            <a:r>
-              <a:rPr lang="pt-BR" baseline="-25000" dirty="0"/>
+              <a:rPr lang="pt-BR" dirty="0" smtClean="0"/>
+              <a:t>item</a:t>
+            </a:r>
+            <a:r>
+              <a:rPr lang="pt-BR" baseline="-25000" dirty="0" smtClean="0"/>
               <a:t>2</a:t>
             </a:r>
             <a:endParaRPr lang="pt-BR" dirty="0"/>
@@ -3645,7 +3650,7 @@
           <p:cNvPr id="11" name="CaixaDeTexto 10">
             <a:extLst>
               <a:ext uri="{FF2B5EF4-FFF2-40B4-BE49-F238E27FC236}">
-                <a16:creationId xmlns:a16="http://schemas.microsoft.com/office/drawing/2014/main" id="{84CE0BF8-FC23-481F-8232-1B36DCDE8465}"/>
+                <a16:creationId xmlns:a16="http://schemas.microsoft.com/office/drawing/2014/main" xmlns="" id="{84CE0BF8-FC23-481F-8232-1B36DCDE8465}"/>
               </a:ext>
             </a:extLst>
           </p:cNvPr>
@@ -3654,8 +3659,8 @@
         </p:nvSpPr>
         <p:spPr>
           <a:xfrm>
-            <a:off x="5991366" y="1753316"/>
-            <a:ext cx="436729" cy="369332"/>
+            <a:off x="5889007" y="1754032"/>
+            <a:ext cx="716508" cy="369332"/>
           </a:xfrm>
           <a:prstGeom prst="rect">
             <a:avLst/>
@@ -3670,11 +3675,11 @@
           <a:p>
             <a:pPr algn="ctr"/>
             <a:r>
-              <a:rPr lang="pt-BR" dirty="0"/>
-              <a:t>x</a:t>
-            </a:r>
-            <a:r>
-              <a:rPr lang="pt-BR" baseline="-25000" dirty="0"/>
+              <a:rPr lang="pt-BR" dirty="0" err="1" smtClean="0"/>
+              <a:t>item</a:t>
+            </a:r>
+            <a:r>
+              <a:rPr lang="pt-BR" baseline="-25000" dirty="0" err="1" smtClean="0"/>
               <a:t>n</a:t>
             </a:r>
             <a:endParaRPr lang="pt-BR" dirty="0"/>
@@ -3686,7 +3691,7 @@
           <p:cNvPr id="12" name="CaixaDeTexto 11">
             <a:extLst>
               <a:ext uri="{FF2B5EF4-FFF2-40B4-BE49-F238E27FC236}">
-                <a16:creationId xmlns:a16="http://schemas.microsoft.com/office/drawing/2014/main" id="{7C6C81CA-5795-021B-4600-43631EE8A5FE}"/>
+                <a16:creationId xmlns:a16="http://schemas.microsoft.com/office/drawing/2014/main" xmlns="" id="{7C6C81CA-5795-021B-4600-43631EE8A5FE}"/>
               </a:ext>
             </a:extLst>
           </p:cNvPr>
@@ -3722,7 +3727,7 @@
           <p:cNvPr id="13" name="CaixaDeTexto 12">
             <a:extLst>
               <a:ext uri="{FF2B5EF4-FFF2-40B4-BE49-F238E27FC236}">
-                <a16:creationId xmlns:a16="http://schemas.microsoft.com/office/drawing/2014/main" id="{2483B34F-55D4-8CF8-2F6B-EC5807B9E772}"/>
+                <a16:creationId xmlns:a16="http://schemas.microsoft.com/office/drawing/2014/main" xmlns="" id="{2483B34F-55D4-8CF8-2F6B-EC5807B9E772}"/>
               </a:ext>
             </a:extLst>
           </p:cNvPr>
@@ -3731,7 +3736,7 @@
         </p:nvSpPr>
         <p:spPr>
           <a:xfrm>
-            <a:off x="2750023" y="2618687"/>
+            <a:off x="1578448" y="2856812"/>
             <a:ext cx="1064525" cy="369332"/>
           </a:xfrm>
           <a:prstGeom prst="rect">
@@ -3757,7 +3762,7 @@
           <p:cNvPr id="14" name="CaixaDeTexto 13">
             <a:extLst>
               <a:ext uri="{FF2B5EF4-FFF2-40B4-BE49-F238E27FC236}">
-                <a16:creationId xmlns:a16="http://schemas.microsoft.com/office/drawing/2014/main" id="{93C75342-FD53-36B1-71DC-E0ECC02DBF3E}"/>
+                <a16:creationId xmlns:a16="http://schemas.microsoft.com/office/drawing/2014/main" xmlns="" id="{93C75342-FD53-36B1-71DC-E0ECC02DBF3E}"/>
               </a:ext>
             </a:extLst>
           </p:cNvPr>
@@ -3766,7 +3771,7 @@
         </p:nvSpPr>
         <p:spPr>
           <a:xfrm>
-            <a:off x="5609228" y="2603356"/>
+            <a:off x="6557748" y="3041478"/>
             <a:ext cx="1201003" cy="369332"/>
           </a:xfrm>
           <a:prstGeom prst="rect">
@@ -3782,9 +3787,10 @@
           <a:p>
             <a:pPr algn="ctr"/>
             <a:r>
-              <a:rPr lang="pt-BR" dirty="0"/>
-              <a:t>Ultimo - 1</a:t>
-            </a:r>
+              <a:rPr lang="pt-BR" dirty="0" smtClean="0"/>
+              <a:t>Ultimo</a:t>
+            </a:r>
+            <a:endParaRPr lang="pt-BR" dirty="0"/>
           </a:p>
         </p:txBody>
       </p:sp>
@@ -3793,7 +3799,7 @@
           <p:cNvPr id="15" name="CaixaDeTexto 14">
             <a:extLst>
               <a:ext uri="{FF2B5EF4-FFF2-40B4-BE49-F238E27FC236}">
-                <a16:creationId xmlns:a16="http://schemas.microsoft.com/office/drawing/2014/main" id="{71A4D838-A344-408A-6B4D-0D44AEA38529}"/>
+                <a16:creationId xmlns:a16="http://schemas.microsoft.com/office/drawing/2014/main" xmlns="" id="{71A4D838-A344-408A-6B4D-0D44AEA38529}"/>
               </a:ext>
             </a:extLst>
           </p:cNvPr>
@@ -3826,23 +3832,23 @@
       </p:sp>
       <p:cxnSp>
         <p:nvCxnSpPr>
-          <p:cNvPr id="17" name="Conector de Seta Reta 16">
-            <a:extLst>
-              <a:ext uri="{FF2B5EF4-FFF2-40B4-BE49-F238E27FC236}">
-                <a16:creationId xmlns:a16="http://schemas.microsoft.com/office/drawing/2014/main" id="{2613A115-7061-6779-4CAF-3535CBC388B1}"/>
+          <p:cNvPr id="25" name="Conector de Seta Reta 24">
+            <a:extLst>
+              <a:ext uri="{FF2B5EF4-FFF2-40B4-BE49-F238E27FC236}">
+                <a16:creationId xmlns:a16="http://schemas.microsoft.com/office/drawing/2014/main" xmlns="" id="{12128865-CAD9-CB51-7027-7B82B244F079}"/>
               </a:ext>
             </a:extLst>
           </p:cNvPr>
           <p:cNvCxnSpPr>
-            <a:stCxn id="4" idx="2"/>
-            <a:endCxn id="13" idx="0"/>
+            <a:stCxn id="8" idx="3"/>
+            <a:endCxn id="15" idx="1"/>
           </p:cNvCxnSpPr>
           <p:nvPr/>
         </p:nvCxnSpPr>
         <p:spPr>
-          <a:xfrm flipH="1">
-            <a:off x="3282286" y="2224585"/>
-            <a:ext cx="1" cy="394102"/>
+          <a:xfrm>
+            <a:off x="7642746" y="1937982"/>
+            <a:ext cx="580028" cy="0"/>
           </a:xfrm>
           <a:prstGeom prst="straightConnector1">
             <a:avLst/>
@@ -3868,26 +3874,19 @@
       </p:cxnSp>
       <p:cxnSp>
         <p:nvCxnSpPr>
-          <p:cNvPr id="20" name="Conector de Seta Reta 19">
-            <a:extLst>
-              <a:ext uri="{FF2B5EF4-FFF2-40B4-BE49-F238E27FC236}">
-                <a16:creationId xmlns:a16="http://schemas.microsoft.com/office/drawing/2014/main" id="{6B41347E-50F1-B0A7-4EEE-98B45E7E29B5}"/>
-              </a:ext>
-            </a:extLst>
-          </p:cNvPr>
+          <p:cNvPr id="23" name="Conector angulado 22"/>
           <p:cNvCxnSpPr>
-            <a:cxnSpLocks/>
-            <a:stCxn id="7" idx="2"/>
-            <a:endCxn id="14" idx="0"/>
+            <a:stCxn id="4" idx="1"/>
+            <a:endCxn id="13" idx="0"/>
           </p:cNvCxnSpPr>
           <p:nvPr/>
         </p:nvCxnSpPr>
         <p:spPr>
-          <a:xfrm>
-            <a:off x="6189260" y="2224585"/>
-            <a:ext cx="20470" cy="378771"/>
-          </a:xfrm>
-          <a:prstGeom prst="straightConnector1">
+          <a:xfrm rot="10800000" flipV="1">
+            <a:off x="2110711" y="1937982"/>
+            <a:ext cx="687080" cy="918830"/>
+          </a:xfrm>
+          <a:prstGeom prst="bentConnector2">
             <a:avLst/>
           </a:prstGeom>
           <a:ln>
@@ -3911,25 +3910,92 @@
       </p:cxnSp>
       <p:cxnSp>
         <p:nvCxnSpPr>
-          <p:cNvPr id="25" name="Conector de Seta Reta 24">
-            <a:extLst>
-              <a:ext uri="{FF2B5EF4-FFF2-40B4-BE49-F238E27FC236}">
-                <a16:creationId xmlns:a16="http://schemas.microsoft.com/office/drawing/2014/main" id="{12128865-CAD9-CB51-7027-7B82B244F079}"/>
-              </a:ext>
-            </a:extLst>
-          </p:cNvPr>
+          <p:cNvPr id="27" name="Conector angulado 26"/>
           <p:cNvCxnSpPr>
-            <a:stCxn id="8" idx="3"/>
-            <a:endCxn id="15" idx="1"/>
+            <a:stCxn id="7" idx="2"/>
+            <a:endCxn id="14" idx="1"/>
           </p:cNvCxnSpPr>
           <p:nvPr/>
         </p:nvCxnSpPr>
         <p:spPr>
-          <a:xfrm>
-            <a:off x="7642746" y="1937982"/>
-            <a:ext cx="580028" cy="0"/>
-          </a:xfrm>
-          <a:prstGeom prst="straightConnector1">
+          <a:xfrm rot="16200000" flipH="1">
+            <a:off x="5872725" y="2541120"/>
+            <a:ext cx="1001559" cy="368488"/>
+          </a:xfrm>
+          <a:prstGeom prst="bentConnector2">
+            <a:avLst/>
+          </a:prstGeom>
+          <a:ln>
+            <a:tailEnd type="triangle"/>
+          </a:ln>
+        </p:spPr>
+        <p:style>
+          <a:lnRef idx="1">
+            <a:schemeClr val="accent1"/>
+          </a:lnRef>
+          <a:fillRef idx="0">
+            <a:schemeClr val="accent1"/>
+          </a:fillRef>
+          <a:effectRef idx="0">
+            <a:schemeClr val="accent1"/>
+          </a:effectRef>
+          <a:fontRef idx="minor">
+            <a:schemeClr val="tx1"/>
+          </a:fontRef>
+        </p:style>
+      </p:cxnSp>
+      <p:sp>
+        <p:nvSpPr>
+          <p:cNvPr id="35" name="CaixaDeTexto 34">
+            <a:extLst>
+              <a:ext uri="{FF2B5EF4-FFF2-40B4-BE49-F238E27FC236}">
+                <a16:creationId xmlns:a16="http://schemas.microsoft.com/office/drawing/2014/main" xmlns="" id="{93C75342-FD53-36B1-71DC-E0ECC02DBF3E}"/>
+              </a:ext>
+            </a:extLst>
+          </p:cNvPr>
+          <p:cNvSpPr txBox="1"/>
+          <p:nvPr/>
+        </p:nvSpPr>
+        <p:spPr>
+          <a:xfrm>
+            <a:off x="6673755" y="547884"/>
+            <a:ext cx="1687916" cy="369332"/>
+          </a:xfrm>
+          <a:prstGeom prst="rect">
+            <a:avLst/>
+          </a:prstGeom>
+          <a:noFill/>
+        </p:spPr>
+        <p:txBody>
+          <a:bodyPr wrap="square" rtlCol="0">
+            <a:spAutoFit/>
+          </a:bodyPr>
+          <a:lstStyle/>
+          <a:p>
+            <a:pPr algn="ctr"/>
+            <a:r>
+              <a:rPr lang="pt-BR" dirty="0" smtClean="0"/>
+              <a:t>MAX_TAM - 1</a:t>
+            </a:r>
+            <a:endParaRPr lang="pt-BR" dirty="0"/>
+          </a:p>
+        </p:txBody>
+      </p:sp>
+      <p:cxnSp>
+        <p:nvCxnSpPr>
+          <p:cNvPr id="39" name="Conector angulado 38"/>
+          <p:cNvCxnSpPr>
+            <a:stCxn id="7" idx="0"/>
+            <a:endCxn id="35" idx="1"/>
+          </p:cNvCxnSpPr>
+          <p:nvPr/>
+        </p:nvCxnSpPr>
+        <p:spPr>
+          <a:xfrm rot="5400000" flipH="1" flipV="1">
+            <a:off x="5972093" y="949718"/>
+            <a:ext cx="918829" cy="484495"/>
+          </a:xfrm>
+          <a:prstGeom prst="bentConnector2">
             <a:avLst/>
           </a:prstGeom>
           <a:ln>
@@ -3986,7 +4052,7 @@
           <p:cNvPr id="29" name="Retângulo 28">
             <a:extLst>
               <a:ext uri="{FF2B5EF4-FFF2-40B4-BE49-F238E27FC236}">
-                <a16:creationId xmlns:a16="http://schemas.microsoft.com/office/drawing/2014/main" id="{F060613B-AEEA-5592-083A-147787DB2F6A}"/>
+                <a16:creationId xmlns:a16="http://schemas.microsoft.com/office/drawing/2014/main" xmlns="" id="{F060613B-AEEA-5592-083A-147787DB2F6A}"/>
               </a:ext>
             </a:extLst>
           </p:cNvPr>
@@ -3995,8 +4061,8 @@
         </p:nvSpPr>
         <p:spPr>
           <a:xfrm>
-            <a:off x="9409711" y="1683357"/>
-            <a:ext cx="825500" cy="899866"/>
+            <a:off x="9438234" y="1829014"/>
+            <a:ext cx="877653" cy="1276830"/>
           </a:xfrm>
           <a:prstGeom prst="rect">
             <a:avLst/>
@@ -4035,7 +4101,7 @@
           <p:cNvPr id="30" name="Retângulo 29">
             <a:extLst>
               <a:ext uri="{FF2B5EF4-FFF2-40B4-BE49-F238E27FC236}">
-                <a16:creationId xmlns:a16="http://schemas.microsoft.com/office/drawing/2014/main" id="{6D19A72E-BCC0-4FAA-A923-0919BF562193}"/>
+                <a16:creationId xmlns:a16="http://schemas.microsoft.com/office/drawing/2014/main" xmlns="" id="{6D19A72E-BCC0-4FAA-A923-0919BF562193}"/>
               </a:ext>
             </a:extLst>
           </p:cNvPr>
@@ -4044,8 +4110,8 @@
         </p:nvSpPr>
         <p:spPr>
           <a:xfrm>
-            <a:off x="9470837" y="2282472"/>
-            <a:ext cx="711200" cy="214454"/>
+            <a:off x="9499361" y="2428128"/>
+            <a:ext cx="756132" cy="304291"/>
           </a:xfrm>
           <a:prstGeom prst="rect">
             <a:avLst/>
@@ -4094,7 +4160,7 @@
           <p:cNvPr id="31" name="CaixaDeTexto 30">
             <a:extLst>
               <a:ext uri="{FF2B5EF4-FFF2-40B4-BE49-F238E27FC236}">
-                <a16:creationId xmlns:a16="http://schemas.microsoft.com/office/drawing/2014/main" id="{8F7B90B2-9107-FE40-B84F-DEF16B081E07}"/>
+                <a16:creationId xmlns:a16="http://schemas.microsoft.com/office/drawing/2014/main" xmlns="" id="{8F7B90B2-9107-FE40-B84F-DEF16B081E07}"/>
               </a:ext>
             </a:extLst>
           </p:cNvPr>
@@ -4103,8 +4169,8 @@
         </p:nvSpPr>
         <p:spPr>
           <a:xfrm>
-            <a:off x="9466861" y="1804463"/>
-            <a:ext cx="711200" cy="430887"/>
+            <a:off x="9495385" y="1950120"/>
+            <a:ext cx="756132" cy="430887"/>
           </a:xfrm>
           <a:prstGeom prst="rect">
             <a:avLst/>
@@ -4146,7 +4212,7 @@
           <p:cNvPr id="48" name="CaixaDeTexto 47">
             <a:extLst>
               <a:ext uri="{FF2B5EF4-FFF2-40B4-BE49-F238E27FC236}">
-                <a16:creationId xmlns:a16="http://schemas.microsoft.com/office/drawing/2014/main" id="{0D27782D-01AE-4F67-5396-EDEEFB10705F}"/>
+                <a16:creationId xmlns:a16="http://schemas.microsoft.com/office/drawing/2014/main" xmlns="" id="{0D27782D-01AE-4F67-5396-EDEEFB10705F}"/>
               </a:ext>
             </a:extLst>
           </p:cNvPr>
@@ -4155,7 +4221,7 @@
         </p:nvSpPr>
         <p:spPr>
           <a:xfrm>
-            <a:off x="2433851" y="5098534"/>
+            <a:off x="1739758" y="580437"/>
             <a:ext cx="2378085" cy="369332"/>
           </a:xfrm>
           <a:prstGeom prst="rect">
@@ -4181,7 +4247,7 @@
           <p:cNvPr id="79" name="Retângulo 78">
             <a:extLst>
               <a:ext uri="{FF2B5EF4-FFF2-40B4-BE49-F238E27FC236}">
-                <a16:creationId xmlns:a16="http://schemas.microsoft.com/office/drawing/2014/main" id="{6F2ADC63-6DEF-CD84-2428-0ACC43092AD0}"/>
+                <a16:creationId xmlns:a16="http://schemas.microsoft.com/office/drawing/2014/main" xmlns="" id="{6F2ADC63-6DEF-CD84-2428-0ACC43092AD0}"/>
               </a:ext>
             </a:extLst>
           </p:cNvPr>
@@ -4190,8 +4256,8 @@
         </p:nvSpPr>
         <p:spPr>
           <a:xfrm>
-            <a:off x="7641440" y="1686033"/>
-            <a:ext cx="825500" cy="899866"/>
+            <a:off x="7669963" y="1831690"/>
+            <a:ext cx="877653" cy="1276830"/>
           </a:xfrm>
           <a:prstGeom prst="rect">
             <a:avLst/>
@@ -4230,7 +4296,7 @@
           <p:cNvPr id="80" name="Retângulo 79">
             <a:extLst>
               <a:ext uri="{FF2B5EF4-FFF2-40B4-BE49-F238E27FC236}">
-                <a16:creationId xmlns:a16="http://schemas.microsoft.com/office/drawing/2014/main" id="{2489BE22-B933-436E-9802-60B5C78642D6}"/>
+                <a16:creationId xmlns:a16="http://schemas.microsoft.com/office/drawing/2014/main" xmlns="" id="{2489BE22-B933-436E-9802-60B5C78642D6}"/>
               </a:ext>
             </a:extLst>
           </p:cNvPr>
@@ -4239,8 +4305,8 @@
         </p:nvSpPr>
         <p:spPr>
           <a:xfrm>
-            <a:off x="7702566" y="2285148"/>
-            <a:ext cx="711200" cy="214454"/>
+            <a:off x="7731090" y="2430804"/>
+            <a:ext cx="756132" cy="304291"/>
           </a:xfrm>
           <a:prstGeom prst="rect">
             <a:avLst/>
@@ -4289,7 +4355,7 @@
           <p:cNvPr id="81" name="CaixaDeTexto 80">
             <a:extLst>
               <a:ext uri="{FF2B5EF4-FFF2-40B4-BE49-F238E27FC236}">
-                <a16:creationId xmlns:a16="http://schemas.microsoft.com/office/drawing/2014/main" id="{0091F7B4-DAB5-7B1F-5194-304B17315D0F}"/>
+                <a16:creationId xmlns:a16="http://schemas.microsoft.com/office/drawing/2014/main" xmlns="" id="{0091F7B4-DAB5-7B1F-5194-304B17315D0F}"/>
               </a:ext>
             </a:extLst>
           </p:cNvPr>
@@ -4298,8 +4364,8 @@
         </p:nvSpPr>
         <p:spPr>
           <a:xfrm>
-            <a:off x="7698590" y="1807139"/>
-            <a:ext cx="711200" cy="430887"/>
+            <a:off x="7727114" y="1952796"/>
+            <a:ext cx="756132" cy="430887"/>
           </a:xfrm>
           <a:prstGeom prst="rect">
             <a:avLst/>
@@ -4341,7 +4407,7 @@
           <p:cNvPr id="84" name="Conector de Seta Reta 83">
             <a:extLst>
               <a:ext uri="{FF2B5EF4-FFF2-40B4-BE49-F238E27FC236}">
-                <a16:creationId xmlns:a16="http://schemas.microsoft.com/office/drawing/2014/main" id="{706A963D-34C8-30CA-2C1C-A67194991AB4}"/>
+                <a16:creationId xmlns:a16="http://schemas.microsoft.com/office/drawing/2014/main" xmlns="" id="{706A963D-34C8-30CA-2C1C-A67194991AB4}"/>
               </a:ext>
             </a:extLst>
           </p:cNvPr>
@@ -4354,8 +4420,8 @@
         </p:nvCxnSpPr>
         <p:spPr>
           <a:xfrm flipV="1">
-            <a:off x="8413766" y="2389699"/>
-            <a:ext cx="1057071" cy="2676"/>
+            <a:off x="8487222" y="2580274"/>
+            <a:ext cx="1012139" cy="2676"/>
           </a:xfrm>
           <a:prstGeom prst="straightConnector1">
             <a:avLst/>
@@ -4384,7 +4450,7 @@
           <p:cNvPr id="85" name="Retângulo 84">
             <a:extLst>
               <a:ext uri="{FF2B5EF4-FFF2-40B4-BE49-F238E27FC236}">
-                <a16:creationId xmlns:a16="http://schemas.microsoft.com/office/drawing/2014/main" id="{72B51AEC-5900-2020-EBF4-0DED4DECC1B0}"/>
+                <a16:creationId xmlns:a16="http://schemas.microsoft.com/office/drawing/2014/main" xmlns="" id="{72B51AEC-5900-2020-EBF4-0DED4DECC1B0}"/>
               </a:ext>
             </a:extLst>
           </p:cNvPr>
@@ -4393,8 +4459,8 @@
         </p:nvSpPr>
         <p:spPr>
           <a:xfrm>
-            <a:off x="5879323" y="1683357"/>
-            <a:ext cx="825500" cy="899866"/>
+            <a:off x="5907846" y="1829014"/>
+            <a:ext cx="877653" cy="1276830"/>
           </a:xfrm>
           <a:prstGeom prst="rect">
             <a:avLst/>
@@ -4433,7 +4499,7 @@
           <p:cNvPr id="86" name="Retângulo 85">
             <a:extLst>
               <a:ext uri="{FF2B5EF4-FFF2-40B4-BE49-F238E27FC236}">
-                <a16:creationId xmlns:a16="http://schemas.microsoft.com/office/drawing/2014/main" id="{38928F13-E87C-695A-7678-6EBC13943581}"/>
+                <a16:creationId xmlns:a16="http://schemas.microsoft.com/office/drawing/2014/main" xmlns="" id="{38928F13-E87C-695A-7678-6EBC13943581}"/>
               </a:ext>
             </a:extLst>
           </p:cNvPr>
@@ -4442,8 +4508,8 @@
         </p:nvSpPr>
         <p:spPr>
           <a:xfrm>
-            <a:off x="5940449" y="2282472"/>
-            <a:ext cx="711200" cy="214454"/>
+            <a:off x="5968973" y="2428128"/>
+            <a:ext cx="756132" cy="304291"/>
           </a:xfrm>
           <a:prstGeom prst="rect">
             <a:avLst/>
@@ -4492,7 +4558,7 @@
           <p:cNvPr id="87" name="CaixaDeTexto 86">
             <a:extLst>
               <a:ext uri="{FF2B5EF4-FFF2-40B4-BE49-F238E27FC236}">
-                <a16:creationId xmlns:a16="http://schemas.microsoft.com/office/drawing/2014/main" id="{F689E330-9CC1-3D5E-EDE1-F5000960AF09}"/>
+                <a16:creationId xmlns:a16="http://schemas.microsoft.com/office/drawing/2014/main" xmlns="" id="{F689E330-9CC1-3D5E-EDE1-F5000960AF09}"/>
               </a:ext>
             </a:extLst>
           </p:cNvPr>
@@ -4501,8 +4567,8 @@
         </p:nvSpPr>
         <p:spPr>
           <a:xfrm>
-            <a:off x="5936473" y="1804463"/>
-            <a:ext cx="711200" cy="430887"/>
+            <a:off x="5964997" y="1950120"/>
+            <a:ext cx="756132" cy="430887"/>
           </a:xfrm>
           <a:prstGeom prst="rect">
             <a:avLst/>
@@ -4544,7 +4610,7 @@
           <p:cNvPr id="92" name="Retângulo 91">
             <a:extLst>
               <a:ext uri="{FF2B5EF4-FFF2-40B4-BE49-F238E27FC236}">
-                <a16:creationId xmlns:a16="http://schemas.microsoft.com/office/drawing/2014/main" id="{4BCE8964-177A-053C-B548-EA12F206A402}"/>
+                <a16:creationId xmlns:a16="http://schemas.microsoft.com/office/drawing/2014/main" xmlns="" id="{4BCE8964-177A-053C-B548-EA12F206A402}"/>
               </a:ext>
             </a:extLst>
           </p:cNvPr>
@@ -4553,8 +4619,8 @@
         </p:nvSpPr>
         <p:spPr>
           <a:xfrm>
-            <a:off x="4055081" y="1669551"/>
-            <a:ext cx="825500" cy="899866"/>
+            <a:off x="4083604" y="1815208"/>
+            <a:ext cx="877653" cy="1276830"/>
           </a:xfrm>
           <a:prstGeom prst="rect">
             <a:avLst/>
@@ -4593,7 +4659,7 @@
           <p:cNvPr id="93" name="Retângulo 92">
             <a:extLst>
               <a:ext uri="{FF2B5EF4-FFF2-40B4-BE49-F238E27FC236}">
-                <a16:creationId xmlns:a16="http://schemas.microsoft.com/office/drawing/2014/main" id="{5FE6C1FC-1A7F-3FFB-C488-4C3049F86300}"/>
+                <a16:creationId xmlns:a16="http://schemas.microsoft.com/office/drawing/2014/main" xmlns="" id="{5FE6C1FC-1A7F-3FFB-C488-4C3049F86300}"/>
               </a:ext>
             </a:extLst>
           </p:cNvPr>
@@ -4602,8 +4668,8 @@
         </p:nvSpPr>
         <p:spPr>
           <a:xfrm>
-            <a:off x="4116207" y="2268666"/>
-            <a:ext cx="711200" cy="214454"/>
+            <a:off x="4144731" y="2414322"/>
+            <a:ext cx="756132" cy="304291"/>
           </a:xfrm>
           <a:prstGeom prst="rect">
             <a:avLst/>
@@ -4652,7 +4718,7 @@
           <p:cNvPr id="94" name="CaixaDeTexto 93">
             <a:extLst>
               <a:ext uri="{FF2B5EF4-FFF2-40B4-BE49-F238E27FC236}">
-                <a16:creationId xmlns:a16="http://schemas.microsoft.com/office/drawing/2014/main" id="{44695489-5BF0-2FE1-2796-FE57CD4859BA}"/>
+                <a16:creationId xmlns:a16="http://schemas.microsoft.com/office/drawing/2014/main" xmlns="" id="{44695489-5BF0-2FE1-2796-FE57CD4859BA}"/>
               </a:ext>
             </a:extLst>
           </p:cNvPr>
@@ -4661,8 +4727,8 @@
         </p:nvSpPr>
         <p:spPr>
           <a:xfrm>
-            <a:off x="4112231" y="1790657"/>
-            <a:ext cx="711200" cy="430887"/>
+            <a:off x="4140755" y="1936314"/>
+            <a:ext cx="756132" cy="430887"/>
           </a:xfrm>
           <a:prstGeom prst="rect">
             <a:avLst/>
@@ -4704,7 +4770,7 @@
           <p:cNvPr id="95" name="Retângulo 94">
             <a:extLst>
               <a:ext uri="{FF2B5EF4-FFF2-40B4-BE49-F238E27FC236}">
-                <a16:creationId xmlns:a16="http://schemas.microsoft.com/office/drawing/2014/main" id="{7566F58C-2ABE-B6A5-0045-E9E1CF17E2B0}"/>
+                <a16:creationId xmlns:a16="http://schemas.microsoft.com/office/drawing/2014/main" xmlns="" id="{7566F58C-2ABE-B6A5-0045-E9E1CF17E2B0}"/>
               </a:ext>
             </a:extLst>
           </p:cNvPr>
@@ -4713,8 +4779,8 @@
         </p:nvSpPr>
         <p:spPr>
           <a:xfrm>
-            <a:off x="1936185" y="1673631"/>
-            <a:ext cx="825500" cy="899866"/>
+            <a:off x="1964708" y="1819288"/>
+            <a:ext cx="877653" cy="1276830"/>
           </a:xfrm>
           <a:prstGeom prst="rect">
             <a:avLst/>
@@ -4753,7 +4819,7 @@
           <p:cNvPr id="96" name="Retângulo 95">
             <a:extLst>
               <a:ext uri="{FF2B5EF4-FFF2-40B4-BE49-F238E27FC236}">
-                <a16:creationId xmlns:a16="http://schemas.microsoft.com/office/drawing/2014/main" id="{5D0856BB-9662-50D2-515C-3A8637A385D3}"/>
+                <a16:creationId xmlns:a16="http://schemas.microsoft.com/office/drawing/2014/main" xmlns="" id="{5D0856BB-9662-50D2-515C-3A8637A385D3}"/>
               </a:ext>
             </a:extLst>
           </p:cNvPr>
@@ -4762,8 +4828,8 @@
         </p:nvSpPr>
         <p:spPr>
           <a:xfrm>
-            <a:off x="1997311" y="2272746"/>
-            <a:ext cx="711200" cy="214454"/>
+            <a:off x="2025835" y="2418402"/>
+            <a:ext cx="756132" cy="304291"/>
           </a:xfrm>
           <a:prstGeom prst="rect">
             <a:avLst/>
@@ -4812,7 +4878,7 @@
           <p:cNvPr id="97" name="CaixaDeTexto 96">
             <a:extLst>
               <a:ext uri="{FF2B5EF4-FFF2-40B4-BE49-F238E27FC236}">
-                <a16:creationId xmlns:a16="http://schemas.microsoft.com/office/drawing/2014/main" id="{DA8536A5-2C76-BBC4-02C3-EF3A39D9DFF0}"/>
+                <a16:creationId xmlns:a16="http://schemas.microsoft.com/office/drawing/2014/main" xmlns="" id="{DA8536A5-2C76-BBC4-02C3-EF3A39D9DFF0}"/>
               </a:ext>
             </a:extLst>
           </p:cNvPr>
@@ -4821,8 +4887,8 @@
         </p:nvSpPr>
         <p:spPr>
           <a:xfrm>
-            <a:off x="1993335" y="1794737"/>
-            <a:ext cx="711200" cy="430887"/>
+            <a:off x="2021859" y="1940394"/>
+            <a:ext cx="756132" cy="430887"/>
           </a:xfrm>
           <a:prstGeom prst="rect">
             <a:avLst/>
@@ -4865,7 +4931,7 @@
           <p:cNvPr id="98" name="Conector de Seta Reta 97">
             <a:extLst>
               <a:ext uri="{FF2B5EF4-FFF2-40B4-BE49-F238E27FC236}">
-                <a16:creationId xmlns:a16="http://schemas.microsoft.com/office/drawing/2014/main" id="{8F17B55B-2CA4-1931-F5AE-4DBBE5A5327B}"/>
+                <a16:creationId xmlns:a16="http://schemas.microsoft.com/office/drawing/2014/main" xmlns="" id="{8F17B55B-2CA4-1931-F5AE-4DBBE5A5327B}"/>
               </a:ext>
             </a:extLst>
           </p:cNvPr>
@@ -4876,9 +4942,9 @@
           <p:nvPr/>
         </p:nvCxnSpPr>
         <p:spPr>
-          <a:xfrm flipV="1">
-            <a:off x="2708511" y="2375893"/>
-            <a:ext cx="1407696" cy="4080"/>
+          <a:xfrm>
+            <a:off x="2737035" y="2525630"/>
+            <a:ext cx="1407696" cy="40838"/>
           </a:xfrm>
           <a:prstGeom prst="straightConnector1">
             <a:avLst/>
@@ -4907,23 +4973,25 @@
           <p:cNvPr id="102" name="Conector: Angulado 101">
             <a:extLst>
               <a:ext uri="{FF2B5EF4-FFF2-40B4-BE49-F238E27FC236}">
-                <a16:creationId xmlns:a16="http://schemas.microsoft.com/office/drawing/2014/main" id="{BDCB629A-ABFB-31E8-A124-F738C3B168E9}"/>
+                <a16:creationId xmlns:a16="http://schemas.microsoft.com/office/drawing/2014/main" xmlns="" id="{BDCB629A-ABFB-31E8-A124-F738C3B168E9}"/>
               </a:ext>
             </a:extLst>
           </p:cNvPr>
           <p:cNvCxnSpPr>
             <a:cxnSpLocks/>
+            <a:stCxn id="132" idx="1"/>
+            <a:endCxn id="48" idx="1"/>
           </p:cNvCxnSpPr>
           <p:nvPr/>
         </p:nvCxnSpPr>
         <p:spPr>
-          <a:xfrm rot="10800000" flipH="1" flipV="1">
-            <a:off x="1993335" y="2010180"/>
-            <a:ext cx="440516" cy="3273019"/>
+          <a:xfrm rot="10800000">
+            <a:off x="1739758" y="765103"/>
+            <a:ext cx="12700" cy="1758948"/>
           </a:xfrm>
           <a:prstGeom prst="bentConnector3">
             <a:avLst>
-              <a:gd name="adj1" fmla="val -185088"/>
+              <a:gd name="adj1" fmla="val 1800000"/>
             </a:avLst>
           </a:prstGeom>
           <a:ln>
@@ -4950,7 +5018,7 @@
           <p:cNvPr id="106" name="Conector de Seta Reta 105">
             <a:extLst>
               <a:ext uri="{FF2B5EF4-FFF2-40B4-BE49-F238E27FC236}">
-                <a16:creationId xmlns:a16="http://schemas.microsoft.com/office/drawing/2014/main" id="{C0860BAC-5416-B408-8027-F41B421E1FE0}"/>
+                <a16:creationId xmlns:a16="http://schemas.microsoft.com/office/drawing/2014/main" xmlns="" id="{C0860BAC-5416-B408-8027-F41B421E1FE0}"/>
               </a:ext>
             </a:extLst>
           </p:cNvPr>
@@ -4963,8 +5031,8 @@
         </p:nvCxnSpPr>
         <p:spPr>
           <a:xfrm>
-            <a:off x="4827407" y="2375893"/>
-            <a:ext cx="1113042" cy="13806"/>
+            <a:off x="4900863" y="2566468"/>
+            <a:ext cx="1068110" cy="13806"/>
           </a:xfrm>
           <a:prstGeom prst="straightConnector1">
             <a:avLst/>
@@ -4993,7 +5061,7 @@
           <p:cNvPr id="108" name="Conector de Seta Reta 107">
             <a:extLst>
               <a:ext uri="{FF2B5EF4-FFF2-40B4-BE49-F238E27FC236}">
-                <a16:creationId xmlns:a16="http://schemas.microsoft.com/office/drawing/2014/main" id="{1F15DDF8-DBAB-0908-3236-B567F97F3138}"/>
+                <a16:creationId xmlns:a16="http://schemas.microsoft.com/office/drawing/2014/main" xmlns="" id="{1F15DDF8-DBAB-0908-3236-B567F97F3138}"/>
               </a:ext>
             </a:extLst>
           </p:cNvPr>
@@ -5005,8 +5073,8 @@
         </p:nvCxnSpPr>
         <p:spPr>
           <a:xfrm>
-            <a:off x="6651649" y="2389699"/>
-            <a:ext cx="1050917" cy="2676"/>
+            <a:off x="6725105" y="2580274"/>
+            <a:ext cx="1005985" cy="2676"/>
           </a:xfrm>
           <a:prstGeom prst="straightConnector1">
             <a:avLst/>
@@ -5035,7 +5103,7 @@
           <p:cNvPr id="121" name="Conector: Angulado 120">
             <a:extLst>
               <a:ext uri="{FF2B5EF4-FFF2-40B4-BE49-F238E27FC236}">
-                <a16:creationId xmlns:a16="http://schemas.microsoft.com/office/drawing/2014/main" id="{65CAF515-207E-D810-84BD-FAEC8463F10D}"/>
+                <a16:creationId xmlns:a16="http://schemas.microsoft.com/office/drawing/2014/main" xmlns="" id="{65CAF515-207E-D810-84BD-FAEC8463F10D}"/>
               </a:ext>
             </a:extLst>
           </p:cNvPr>
@@ -5047,13 +5115,13 @@
           <p:nvPr/>
         </p:nvCxnSpPr>
         <p:spPr>
-          <a:xfrm flipH="1">
-            <a:off x="9352561" y="2019907"/>
-            <a:ext cx="825500" cy="2787410"/>
+          <a:xfrm flipH="1" flipV="1">
+            <a:off x="8483246" y="922184"/>
+            <a:ext cx="1768271" cy="1243380"/>
           </a:xfrm>
           <a:prstGeom prst="bentConnector3">
             <a:avLst>
-              <a:gd name="adj1" fmla="val -82250"/>
+              <a:gd name="adj1" fmla="val -12928"/>
             </a:avLst>
           </a:prstGeom>
           <a:ln>
@@ -5080,7 +5148,7 @@
           <p:cNvPr id="126" name="CaixaDeTexto 125">
             <a:extLst>
               <a:ext uri="{FF2B5EF4-FFF2-40B4-BE49-F238E27FC236}">
-                <a16:creationId xmlns:a16="http://schemas.microsoft.com/office/drawing/2014/main" id="{843FA6C6-B858-CD50-444C-67434A16AE15}"/>
+                <a16:creationId xmlns:a16="http://schemas.microsoft.com/office/drawing/2014/main" xmlns="" id="{843FA6C6-B858-CD50-444C-67434A16AE15}"/>
               </a:ext>
             </a:extLst>
           </p:cNvPr>
@@ -5089,7 +5157,7 @@
         </p:nvSpPr>
         <p:spPr>
           <a:xfrm>
-            <a:off x="8409790" y="4622651"/>
+            <a:off x="7540475" y="737518"/>
             <a:ext cx="942771" cy="369332"/>
           </a:xfrm>
           <a:prstGeom prst="rect">
@@ -5115,7 +5183,7 @@
           <p:cNvPr id="132" name="Retângulo 131">
             <a:extLst>
               <a:ext uri="{FF2B5EF4-FFF2-40B4-BE49-F238E27FC236}">
-                <a16:creationId xmlns:a16="http://schemas.microsoft.com/office/drawing/2014/main" id="{2A221700-C843-3CA7-A834-4FD26B64D26B}"/>
+                <a16:creationId xmlns:a16="http://schemas.microsoft.com/office/drawing/2014/main" xmlns="" id="{2A221700-C843-3CA7-A834-4FD26B64D26B}"/>
               </a:ext>
             </a:extLst>
           </p:cNvPr>
@@ -5124,8 +5192,8 @@
         </p:nvSpPr>
         <p:spPr>
           <a:xfrm>
-            <a:off x="1711234" y="1487606"/>
-            <a:ext cx="8871045" cy="1255594"/>
+            <a:off x="1739758" y="1633263"/>
+            <a:ext cx="9431499" cy="1781576"/>
           </a:xfrm>
           <a:prstGeom prst="rect">
             <a:avLst/>
@@ -5154,6 +5222,486 @@
           <a:p>
             <a:pPr algn="ctr"/>
             <a:endParaRPr lang="pt-BR"/>
+          </a:p>
+        </p:txBody>
+      </p:sp>
+      <p:sp>
+        <p:nvSpPr>
+          <p:cNvPr id="39" name="Retângulo 38">
+            <a:extLst>
+              <a:ext uri="{FF2B5EF4-FFF2-40B4-BE49-F238E27FC236}">
+                <a16:creationId xmlns:a16="http://schemas.microsoft.com/office/drawing/2014/main" xmlns="" id="{4BCE8964-177A-053C-B548-EA12F206A402}"/>
+              </a:ext>
+            </a:extLst>
+          </p:cNvPr>
+          <p:cNvSpPr/>
+          <p:nvPr/>
+        </p:nvSpPr>
+        <p:spPr>
+          <a:xfrm>
+            <a:off x="5861781" y="4461260"/>
+            <a:ext cx="877653" cy="1276830"/>
+          </a:xfrm>
+          <a:prstGeom prst="rect">
+            <a:avLst/>
+          </a:prstGeom>
+          <a:solidFill>
+            <a:schemeClr val="tx2"/>
+          </a:solidFill>
+        </p:spPr>
+        <p:style>
+          <a:lnRef idx="2">
+            <a:schemeClr val="dk1">
+              <a:shade val="50000"/>
+            </a:schemeClr>
+          </a:lnRef>
+          <a:fillRef idx="1">
+            <a:schemeClr val="dk1"/>
+          </a:fillRef>
+          <a:effectRef idx="0">
+            <a:schemeClr val="dk1"/>
+          </a:effectRef>
+          <a:fontRef idx="minor">
+            <a:schemeClr val="lt1"/>
+          </a:fontRef>
+        </p:style>
+        <p:txBody>
+          <a:bodyPr rtlCol="0" anchor="ctr"/>
+          <a:lstStyle/>
+          <a:p>
+            <a:pPr algn="ctr"/>
+            <a:endParaRPr lang="pt-BR"/>
+          </a:p>
+        </p:txBody>
+      </p:sp>
+      <p:sp>
+        <p:nvSpPr>
+          <p:cNvPr id="40" name="Retângulo 39">
+            <a:extLst>
+              <a:ext uri="{FF2B5EF4-FFF2-40B4-BE49-F238E27FC236}">
+                <a16:creationId xmlns:a16="http://schemas.microsoft.com/office/drawing/2014/main" xmlns="" id="{5FE6C1FC-1A7F-3FFB-C488-4C3049F86300}"/>
+              </a:ext>
+            </a:extLst>
+          </p:cNvPr>
+          <p:cNvSpPr/>
+          <p:nvPr/>
+        </p:nvSpPr>
+        <p:spPr>
+          <a:xfrm>
+            <a:off x="5922908" y="5060374"/>
+            <a:ext cx="756132" cy="304291"/>
+          </a:xfrm>
+          <a:prstGeom prst="rect">
+            <a:avLst/>
+          </a:prstGeom>
+          <a:solidFill>
+            <a:schemeClr val="bg1"/>
+          </a:solidFill>
+        </p:spPr>
+        <p:style>
+          <a:lnRef idx="2">
+            <a:schemeClr val="dk1">
+              <a:shade val="50000"/>
+            </a:schemeClr>
+          </a:lnRef>
+          <a:fillRef idx="1">
+            <a:schemeClr val="dk1"/>
+          </a:fillRef>
+          <a:effectRef idx="0">
+            <a:schemeClr val="dk1"/>
+          </a:effectRef>
+          <a:fontRef idx="minor">
+            <a:schemeClr val="lt1"/>
+          </a:fontRef>
+        </p:style>
+        <p:txBody>
+          <a:bodyPr rtlCol="0" anchor="ctr"/>
+          <a:lstStyle/>
+          <a:p>
+            <a:pPr algn="ctr"/>
+            <a:r>
+              <a:rPr lang="pt-BR" sz="1600" i="1" dirty="0">
+                <a:solidFill>
+                  <a:schemeClr val="tx1">
+                    <a:lumMod val="95000"/>
+                    <a:lumOff val="5000"/>
+                  </a:schemeClr>
+                </a:solidFill>
+              </a:rPr>
+              <a:t>prox.</a:t>
+            </a:r>
+          </a:p>
+        </p:txBody>
+      </p:sp>
+      <p:sp>
+        <p:nvSpPr>
+          <p:cNvPr id="41" name="CaixaDeTexto 40">
+            <a:extLst>
+              <a:ext uri="{FF2B5EF4-FFF2-40B4-BE49-F238E27FC236}">
+                <a16:creationId xmlns:a16="http://schemas.microsoft.com/office/drawing/2014/main" xmlns="" id="{44695489-5BF0-2FE1-2796-FE57CD4859BA}"/>
+              </a:ext>
+            </a:extLst>
+          </p:cNvPr>
+          <p:cNvSpPr txBox="1"/>
+          <p:nvPr/>
+        </p:nvSpPr>
+        <p:spPr>
+          <a:xfrm>
+            <a:off x="5918932" y="4582366"/>
+            <a:ext cx="756132" cy="430887"/>
+          </a:xfrm>
+          <a:prstGeom prst="rect">
+            <a:avLst/>
+          </a:prstGeom>
+          <a:solidFill>
+            <a:schemeClr val="bg2"/>
+          </a:solidFill>
+        </p:spPr>
+        <p:style>
+          <a:lnRef idx="2">
+            <a:schemeClr val="dk1"/>
+          </a:lnRef>
+          <a:fillRef idx="1">
+            <a:schemeClr val="lt1"/>
+          </a:fillRef>
+          <a:effectRef idx="0">
+            <a:schemeClr val="dk1"/>
+          </a:effectRef>
+          <a:fontRef idx="minor">
+            <a:schemeClr val="dk1"/>
+          </a:fontRef>
+        </p:style>
+        <p:txBody>
+          <a:bodyPr wrap="square" rtlCol="0">
+            <a:spAutoFit/>
+          </a:bodyPr>
+          <a:lstStyle/>
+          <a:p>
+            <a:pPr algn="ctr"/>
+            <a:r>
+              <a:rPr lang="pt-BR" sz="1100" dirty="0"/>
+              <a:t>Item(id, nome)</a:t>
+            </a:r>
+          </a:p>
+        </p:txBody>
+      </p:sp>
+      <p:sp>
+        <p:nvSpPr>
+          <p:cNvPr id="42" name="Retângulo 41">
+            <a:extLst>
+              <a:ext uri="{FF2B5EF4-FFF2-40B4-BE49-F238E27FC236}">
+                <a16:creationId xmlns:a16="http://schemas.microsoft.com/office/drawing/2014/main" xmlns="" id="{4BCE8964-177A-053C-B548-EA12F206A402}"/>
+              </a:ext>
+            </a:extLst>
+          </p:cNvPr>
+          <p:cNvSpPr/>
+          <p:nvPr/>
+        </p:nvSpPr>
+        <p:spPr>
+          <a:xfrm>
+            <a:off x="4140755" y="4481151"/>
+            <a:ext cx="877653" cy="1276830"/>
+          </a:xfrm>
+          <a:prstGeom prst="rect">
+            <a:avLst/>
+          </a:prstGeom>
+          <a:solidFill>
+            <a:schemeClr val="tx2"/>
+          </a:solidFill>
+        </p:spPr>
+        <p:style>
+          <a:lnRef idx="2">
+            <a:schemeClr val="dk1">
+              <a:shade val="50000"/>
+            </a:schemeClr>
+          </a:lnRef>
+          <a:fillRef idx="1">
+            <a:schemeClr val="dk1"/>
+          </a:fillRef>
+          <a:effectRef idx="0">
+            <a:schemeClr val="dk1"/>
+          </a:effectRef>
+          <a:fontRef idx="minor">
+            <a:schemeClr val="lt1"/>
+          </a:fontRef>
+        </p:style>
+        <p:txBody>
+          <a:bodyPr rtlCol="0" anchor="ctr"/>
+          <a:lstStyle/>
+          <a:p>
+            <a:pPr algn="ctr"/>
+            <a:endParaRPr lang="pt-BR"/>
+          </a:p>
+        </p:txBody>
+      </p:sp>
+      <p:sp>
+        <p:nvSpPr>
+          <p:cNvPr id="43" name="Retângulo 42">
+            <a:extLst>
+              <a:ext uri="{FF2B5EF4-FFF2-40B4-BE49-F238E27FC236}">
+                <a16:creationId xmlns:a16="http://schemas.microsoft.com/office/drawing/2014/main" xmlns="" id="{5FE6C1FC-1A7F-3FFB-C488-4C3049F86300}"/>
+              </a:ext>
+            </a:extLst>
+          </p:cNvPr>
+          <p:cNvSpPr/>
+          <p:nvPr/>
+        </p:nvSpPr>
+        <p:spPr>
+          <a:xfrm>
+            <a:off x="4201882" y="5080265"/>
+            <a:ext cx="756132" cy="304291"/>
+          </a:xfrm>
+          <a:prstGeom prst="rect">
+            <a:avLst/>
+          </a:prstGeom>
+          <a:solidFill>
+            <a:schemeClr val="bg1"/>
+          </a:solidFill>
+        </p:spPr>
+        <p:style>
+          <a:lnRef idx="2">
+            <a:schemeClr val="dk1">
+              <a:shade val="50000"/>
+            </a:schemeClr>
+          </a:lnRef>
+          <a:fillRef idx="1">
+            <a:schemeClr val="dk1"/>
+          </a:fillRef>
+          <a:effectRef idx="0">
+            <a:schemeClr val="dk1"/>
+          </a:effectRef>
+          <a:fontRef idx="minor">
+            <a:schemeClr val="lt1"/>
+          </a:fontRef>
+        </p:style>
+        <p:txBody>
+          <a:bodyPr rtlCol="0" anchor="ctr"/>
+          <a:lstStyle/>
+          <a:p>
+            <a:pPr algn="ctr"/>
+            <a:r>
+              <a:rPr lang="pt-BR" sz="1600" i="1" dirty="0">
+                <a:solidFill>
+                  <a:schemeClr val="tx1">
+                    <a:lumMod val="95000"/>
+                    <a:lumOff val="5000"/>
+                  </a:schemeClr>
+                </a:solidFill>
+              </a:rPr>
+              <a:t>prox.</a:t>
+            </a:r>
+          </a:p>
+        </p:txBody>
+      </p:sp>
+      <p:sp>
+        <p:nvSpPr>
+          <p:cNvPr id="44" name="CaixaDeTexto 43">
+            <a:extLst>
+              <a:ext uri="{FF2B5EF4-FFF2-40B4-BE49-F238E27FC236}">
+                <a16:creationId xmlns:a16="http://schemas.microsoft.com/office/drawing/2014/main" xmlns="" id="{44695489-5BF0-2FE1-2796-FE57CD4859BA}"/>
+              </a:ext>
+            </a:extLst>
+          </p:cNvPr>
+          <p:cNvSpPr txBox="1"/>
+          <p:nvPr/>
+        </p:nvSpPr>
+        <p:spPr>
+          <a:xfrm>
+            <a:off x="4197906" y="4602257"/>
+            <a:ext cx="756132" cy="430887"/>
+          </a:xfrm>
+          <a:prstGeom prst="rect">
+            <a:avLst/>
+          </a:prstGeom>
+          <a:solidFill>
+            <a:schemeClr val="bg2"/>
+          </a:solidFill>
+        </p:spPr>
+        <p:style>
+          <a:lnRef idx="2">
+            <a:schemeClr val="dk1"/>
+          </a:lnRef>
+          <a:fillRef idx="1">
+            <a:schemeClr val="lt1"/>
+          </a:fillRef>
+          <a:effectRef idx="0">
+            <a:schemeClr val="dk1"/>
+          </a:effectRef>
+          <a:fontRef idx="minor">
+            <a:schemeClr val="dk1"/>
+          </a:fontRef>
+        </p:style>
+        <p:txBody>
+          <a:bodyPr wrap="square" rtlCol="0">
+            <a:spAutoFit/>
+          </a:bodyPr>
+          <a:lstStyle/>
+          <a:p>
+            <a:pPr algn="ctr"/>
+            <a:r>
+              <a:rPr lang="pt-BR" sz="1100" dirty="0"/>
+              <a:t>Item(id, nome)</a:t>
+            </a:r>
+          </a:p>
+        </p:txBody>
+      </p:sp>
+      <p:sp>
+        <p:nvSpPr>
+          <p:cNvPr id="45" name="Retângulo 44">
+            <a:extLst>
+              <a:ext uri="{FF2B5EF4-FFF2-40B4-BE49-F238E27FC236}">
+                <a16:creationId xmlns:a16="http://schemas.microsoft.com/office/drawing/2014/main" xmlns="" id="{4BCE8964-177A-053C-B548-EA12F206A402}"/>
+              </a:ext>
+            </a:extLst>
+          </p:cNvPr>
+          <p:cNvSpPr/>
+          <p:nvPr/>
+        </p:nvSpPr>
+        <p:spPr>
+          <a:xfrm>
+            <a:off x="2419729" y="4441850"/>
+            <a:ext cx="877653" cy="1276830"/>
+          </a:xfrm>
+          <a:prstGeom prst="rect">
+            <a:avLst/>
+          </a:prstGeom>
+          <a:solidFill>
+            <a:schemeClr val="tx2"/>
+          </a:solidFill>
+        </p:spPr>
+        <p:style>
+          <a:lnRef idx="2">
+            <a:schemeClr val="dk1">
+              <a:shade val="50000"/>
+            </a:schemeClr>
+          </a:lnRef>
+          <a:fillRef idx="1">
+            <a:schemeClr val="dk1"/>
+          </a:fillRef>
+          <a:effectRef idx="0">
+            <a:schemeClr val="dk1"/>
+          </a:effectRef>
+          <a:fontRef idx="minor">
+            <a:schemeClr val="lt1"/>
+          </a:fontRef>
+        </p:style>
+        <p:txBody>
+          <a:bodyPr rtlCol="0" anchor="ctr"/>
+          <a:lstStyle/>
+          <a:p>
+            <a:pPr algn="ctr"/>
+            <a:endParaRPr lang="pt-BR"/>
+          </a:p>
+        </p:txBody>
+      </p:sp>
+      <p:sp>
+        <p:nvSpPr>
+          <p:cNvPr id="46" name="Retângulo 45">
+            <a:extLst>
+              <a:ext uri="{FF2B5EF4-FFF2-40B4-BE49-F238E27FC236}">
+                <a16:creationId xmlns:a16="http://schemas.microsoft.com/office/drawing/2014/main" xmlns="" id="{5FE6C1FC-1A7F-3FFB-C488-4C3049F86300}"/>
+              </a:ext>
+            </a:extLst>
+          </p:cNvPr>
+          <p:cNvSpPr/>
+          <p:nvPr/>
+        </p:nvSpPr>
+        <p:spPr>
+          <a:xfrm>
+            <a:off x="2480856" y="5040964"/>
+            <a:ext cx="756132" cy="304291"/>
+          </a:xfrm>
+          <a:prstGeom prst="rect">
+            <a:avLst/>
+          </a:prstGeom>
+          <a:solidFill>
+            <a:schemeClr val="bg1"/>
+          </a:solidFill>
+        </p:spPr>
+        <p:style>
+          <a:lnRef idx="2">
+            <a:schemeClr val="dk1">
+              <a:shade val="50000"/>
+            </a:schemeClr>
+          </a:lnRef>
+          <a:fillRef idx="1">
+            <a:schemeClr val="dk1"/>
+          </a:fillRef>
+          <a:effectRef idx="0">
+            <a:schemeClr val="dk1"/>
+          </a:effectRef>
+          <a:fontRef idx="minor">
+            <a:schemeClr val="lt1"/>
+          </a:fontRef>
+        </p:style>
+        <p:txBody>
+          <a:bodyPr rtlCol="0" anchor="ctr"/>
+          <a:lstStyle/>
+          <a:p>
+            <a:pPr algn="ctr"/>
+            <a:r>
+              <a:rPr lang="pt-BR" sz="1600" i="1" dirty="0">
+                <a:solidFill>
+                  <a:schemeClr val="tx1">
+                    <a:lumMod val="95000"/>
+                    <a:lumOff val="5000"/>
+                  </a:schemeClr>
+                </a:solidFill>
+              </a:rPr>
+              <a:t>prox.</a:t>
+            </a:r>
+          </a:p>
+        </p:txBody>
+      </p:sp>
+      <p:sp>
+        <p:nvSpPr>
+          <p:cNvPr id="47" name="CaixaDeTexto 46">
+            <a:extLst>
+              <a:ext uri="{FF2B5EF4-FFF2-40B4-BE49-F238E27FC236}">
+                <a16:creationId xmlns:a16="http://schemas.microsoft.com/office/drawing/2014/main" xmlns="" id="{44695489-5BF0-2FE1-2796-FE57CD4859BA}"/>
+              </a:ext>
+            </a:extLst>
+          </p:cNvPr>
+          <p:cNvSpPr txBox="1"/>
+          <p:nvPr/>
+        </p:nvSpPr>
+        <p:spPr>
+          <a:xfrm>
+            <a:off x="2476880" y="4562956"/>
+            <a:ext cx="756132" cy="430887"/>
+          </a:xfrm>
+          <a:prstGeom prst="rect">
+            <a:avLst/>
+          </a:prstGeom>
+          <a:solidFill>
+            <a:schemeClr val="bg2"/>
+          </a:solidFill>
+        </p:spPr>
+        <p:style>
+          <a:lnRef idx="2">
+            <a:schemeClr val="dk1"/>
+          </a:lnRef>
+          <a:fillRef idx="1">
+            <a:schemeClr val="lt1"/>
+          </a:fillRef>
+          <a:effectRef idx="0">
+            <a:schemeClr val="dk1"/>
+          </a:effectRef>
+          <a:fontRef idx="minor">
+            <a:schemeClr val="dk1"/>
+          </a:fontRef>
+        </p:style>
+        <p:txBody>
+          <a:bodyPr wrap="square" rtlCol="0">
+            <a:spAutoFit/>
+          </a:bodyPr>
+          <a:lstStyle/>
+          <a:p>
+            <a:pPr algn="ctr"/>
+            <a:r>
+              <a:rPr lang="pt-BR" sz="1100" dirty="0"/>
+              <a:t>Item(id, nome)</a:t>
+            </a:r>
           </a:p>
         </p:txBody>
       </p:sp>

</xml_diff>